<commit_message>
Templates pptx - Music game page
</commit_message>
<xml_diff>
--- a/Presentation.pptx
+++ b/Presentation.pptx
@@ -1,11 +1,16 @@
 
 <file path=ppt/presentation.xml><?xml version="1.0" encoding="utf-8"?>
-<p:presentation xmlns:a="http://schemas.openxmlformats.org/drawingml/2006/main" xmlns:r="http://schemas.openxmlformats.org/officeDocument/2006/relationships" xmlns:p="http://schemas.openxmlformats.org/presentationml/2006/main" saveSubsetFonts="1">
+<p:presentation xmlns:a="http://schemas.openxmlformats.org/drawingml/2006/main" xmlns:r="http://schemas.openxmlformats.org/officeDocument/2006/relationships" xmlns:p="http://schemas.openxmlformats.org/presentationml/2006/main" showSpecialPlsOnTitleSld="0" saveSubsetFonts="1">
   <p:sldMasterIdLst>
     <p:sldMasterId id="2147483648" r:id="rId1"/>
   </p:sldMasterIdLst>
+  <p:notesMasterIdLst>
+    <p:notesMasterId r:id="rId5"/>
+  </p:notesMasterIdLst>
   <p:sldIdLst>
     <p:sldId id="256" r:id="rId2"/>
+    <p:sldId id="257" r:id="rId3"/>
+    <p:sldId id="258" r:id="rId4"/>
   </p:sldIdLst>
   <p:sldSz cx="12192000" cy="6858000"/>
   <p:notesSz cx="6858000" cy="9144000"/>
@@ -104,7 +109,530 @@
       </a:defRPr>
     </a:lvl9pPr>
   </p:defaultTextStyle>
+  <p:extLst>
+    <p:ext uri="{EFAFB233-063F-42B5-8137-9DF3F51BA10A}">
+      <p15:sldGuideLst xmlns:p15="http://schemas.microsoft.com/office/powerpoint/2012/main"/>
+    </p:ext>
+  </p:extLst>
 </p:presentation>
+</file>
+
+<file path=ppt/notesMasters/notesMaster1.xml><?xml version="1.0" encoding="utf-8"?>
+<p:notesMaster xmlns:a="http://schemas.openxmlformats.org/drawingml/2006/main" xmlns:r="http://schemas.openxmlformats.org/officeDocument/2006/relationships" xmlns:p="http://schemas.openxmlformats.org/presentationml/2006/main">
+  <p:cSld>
+    <p:bg>
+      <p:bgRef idx="1001">
+        <a:schemeClr val="bg1"/>
+      </p:bgRef>
+    </p:bg>
+    <p:spTree>
+      <p:nvGrpSpPr>
+        <p:cNvPr id="1" name=""/>
+        <p:cNvGrpSpPr/>
+        <p:nvPr/>
+      </p:nvGrpSpPr>
+      <p:grpSpPr>
+        <a:xfrm>
+          <a:off x="0" y="0"/>
+          <a:ext cx="0" cy="0"/>
+          <a:chOff x="0" y="0"/>
+          <a:chExt cx="0" cy="0"/>
+        </a:xfrm>
+      </p:grpSpPr>
+      <p:sp>
+        <p:nvSpPr>
+          <p:cNvPr id="2" name="Espace réservé de l'en-tête 1"/>
+          <p:cNvSpPr>
+            <a:spLocks noGrp="1"/>
+          </p:cNvSpPr>
+          <p:nvPr>
+            <p:ph type="hdr" sz="quarter"/>
+          </p:nvPr>
+        </p:nvSpPr>
+        <p:spPr>
+          <a:xfrm>
+            <a:off x="0" y="0"/>
+            <a:ext cx="2971800" cy="458788"/>
+          </a:xfrm>
+          <a:prstGeom prst="rect">
+            <a:avLst/>
+          </a:prstGeom>
+        </p:spPr>
+        <p:txBody>
+          <a:bodyPr vert="horz" lIns="91440" tIns="45720" rIns="91440" bIns="45720" rtlCol="0"/>
+          <a:lstStyle>
+            <a:lvl1pPr algn="l">
+              <a:defRPr sz="1200"/>
+            </a:lvl1pPr>
+          </a:lstStyle>
+          <a:p>
+            <a:endParaRPr lang="fr-FR"/>
+          </a:p>
+        </p:txBody>
+      </p:sp>
+      <p:sp>
+        <p:nvSpPr>
+          <p:cNvPr id="3" name="Espace réservé de la date 2"/>
+          <p:cNvSpPr>
+            <a:spLocks noGrp="1"/>
+          </p:cNvSpPr>
+          <p:nvPr>
+            <p:ph type="dt" idx="1"/>
+          </p:nvPr>
+        </p:nvSpPr>
+        <p:spPr>
+          <a:xfrm>
+            <a:off x="3884613" y="0"/>
+            <a:ext cx="2971800" cy="458788"/>
+          </a:xfrm>
+          <a:prstGeom prst="rect">
+            <a:avLst/>
+          </a:prstGeom>
+        </p:spPr>
+        <p:txBody>
+          <a:bodyPr vert="horz" lIns="91440" tIns="45720" rIns="91440" bIns="45720" rtlCol="0"/>
+          <a:lstStyle>
+            <a:lvl1pPr algn="r">
+              <a:defRPr sz="1200"/>
+            </a:lvl1pPr>
+          </a:lstStyle>
+          <a:p>
+            <a:fld id="{3C783A4A-DA22-4EFB-AF01-108B39BE77A0}" type="datetimeFigureOut">
+              <a:rPr lang="fr-FR" smtClean="0"/>
+              <a:t>17/03/2016</a:t>
+            </a:fld>
+            <a:endParaRPr lang="fr-FR"/>
+          </a:p>
+        </p:txBody>
+      </p:sp>
+      <p:sp>
+        <p:nvSpPr>
+          <p:cNvPr id="4" name="Espace réservé de l'image des diapositives 3"/>
+          <p:cNvSpPr>
+            <a:spLocks noGrp="1" noRot="1" noChangeAspect="1"/>
+          </p:cNvSpPr>
+          <p:nvPr>
+            <p:ph type="sldImg" idx="2"/>
+          </p:nvPr>
+        </p:nvSpPr>
+        <p:spPr>
+          <a:xfrm>
+            <a:off x="685800" y="1143000"/>
+            <a:ext cx="5486400" cy="3086100"/>
+          </a:xfrm>
+          <a:prstGeom prst="rect">
+            <a:avLst/>
+          </a:prstGeom>
+          <a:noFill/>
+          <a:ln w="12700">
+            <a:solidFill>
+              <a:prstClr val="black"/>
+            </a:solidFill>
+          </a:ln>
+        </p:spPr>
+        <p:txBody>
+          <a:bodyPr vert="horz" lIns="91440" tIns="45720" rIns="91440" bIns="45720" rtlCol="0" anchor="ctr"/>
+          <a:lstStyle/>
+          <a:p>
+            <a:endParaRPr lang="fr-FR"/>
+          </a:p>
+        </p:txBody>
+      </p:sp>
+      <p:sp>
+        <p:nvSpPr>
+          <p:cNvPr id="5" name="Espace réservé des commentaires 4"/>
+          <p:cNvSpPr>
+            <a:spLocks noGrp="1"/>
+          </p:cNvSpPr>
+          <p:nvPr>
+            <p:ph type="body" sz="quarter" idx="3"/>
+          </p:nvPr>
+        </p:nvSpPr>
+        <p:spPr>
+          <a:xfrm>
+            <a:off x="685800" y="4400550"/>
+            <a:ext cx="5486400" cy="3600450"/>
+          </a:xfrm>
+          <a:prstGeom prst="rect">
+            <a:avLst/>
+          </a:prstGeom>
+        </p:spPr>
+        <p:txBody>
+          <a:bodyPr vert="horz" lIns="91440" tIns="45720" rIns="91440" bIns="45720" rtlCol="0"/>
+          <a:lstStyle/>
+          <a:p>
+            <a:pPr lvl="0"/>
+            <a:r>
+              <a:rPr lang="fr-FR" smtClean="0"/>
+              <a:t>Modifiez les styles du texte du masque</a:t>
+            </a:r>
+          </a:p>
+          <a:p>
+            <a:pPr lvl="1"/>
+            <a:r>
+              <a:rPr lang="fr-FR" smtClean="0"/>
+              <a:t>Deuxième niveau</a:t>
+            </a:r>
+          </a:p>
+          <a:p>
+            <a:pPr lvl="2"/>
+            <a:r>
+              <a:rPr lang="fr-FR" smtClean="0"/>
+              <a:t>Troisième niveau</a:t>
+            </a:r>
+          </a:p>
+          <a:p>
+            <a:pPr lvl="3"/>
+            <a:r>
+              <a:rPr lang="fr-FR" smtClean="0"/>
+              <a:t>Quatrième niveau</a:t>
+            </a:r>
+          </a:p>
+          <a:p>
+            <a:pPr lvl="4"/>
+            <a:r>
+              <a:rPr lang="fr-FR" smtClean="0"/>
+              <a:t>Cinquième niveau</a:t>
+            </a:r>
+            <a:endParaRPr lang="fr-FR"/>
+          </a:p>
+        </p:txBody>
+      </p:sp>
+      <p:sp>
+        <p:nvSpPr>
+          <p:cNvPr id="6" name="Espace réservé du pied de page 5"/>
+          <p:cNvSpPr>
+            <a:spLocks noGrp="1"/>
+          </p:cNvSpPr>
+          <p:nvPr>
+            <p:ph type="ftr" sz="quarter" idx="4"/>
+          </p:nvPr>
+        </p:nvSpPr>
+        <p:spPr>
+          <a:xfrm>
+            <a:off x="0" y="8685213"/>
+            <a:ext cx="2971800" cy="458787"/>
+          </a:xfrm>
+          <a:prstGeom prst="rect">
+            <a:avLst/>
+          </a:prstGeom>
+        </p:spPr>
+        <p:txBody>
+          <a:bodyPr vert="horz" lIns="91440" tIns="45720" rIns="91440" bIns="45720" rtlCol="0" anchor="b"/>
+          <a:lstStyle>
+            <a:lvl1pPr algn="l">
+              <a:defRPr sz="1200"/>
+            </a:lvl1pPr>
+          </a:lstStyle>
+          <a:p>
+            <a:endParaRPr lang="fr-FR"/>
+          </a:p>
+        </p:txBody>
+      </p:sp>
+      <p:sp>
+        <p:nvSpPr>
+          <p:cNvPr id="7" name="Espace réservé du numéro de diapositive 6"/>
+          <p:cNvSpPr>
+            <a:spLocks noGrp="1"/>
+          </p:cNvSpPr>
+          <p:nvPr>
+            <p:ph type="sldNum" sz="quarter" idx="5"/>
+          </p:nvPr>
+        </p:nvSpPr>
+        <p:spPr>
+          <a:xfrm>
+            <a:off x="3884613" y="8685213"/>
+            <a:ext cx="2971800" cy="458787"/>
+          </a:xfrm>
+          <a:prstGeom prst="rect">
+            <a:avLst/>
+          </a:prstGeom>
+        </p:spPr>
+        <p:txBody>
+          <a:bodyPr vert="horz" lIns="91440" tIns="45720" rIns="91440" bIns="45720" rtlCol="0" anchor="b"/>
+          <a:lstStyle>
+            <a:lvl1pPr algn="r">
+              <a:defRPr sz="1200"/>
+            </a:lvl1pPr>
+          </a:lstStyle>
+          <a:p>
+            <a:fld id="{3C22D28A-14A0-4ACF-9A0E-BCD287B65FBA}" type="slidenum">
+              <a:rPr lang="fr-FR" smtClean="0"/>
+              <a:t>‹N°›</a:t>
+            </a:fld>
+            <a:endParaRPr lang="fr-FR"/>
+          </a:p>
+        </p:txBody>
+      </p:sp>
+    </p:spTree>
+    <p:extLst>
+      <p:ext uri="{BB962C8B-B14F-4D97-AF65-F5344CB8AC3E}">
+        <p14:creationId xmlns:p14="http://schemas.microsoft.com/office/powerpoint/2010/main" val="3975029562"/>
+      </p:ext>
+    </p:extLst>
+  </p:cSld>
+  <p:clrMap bg1="lt1" tx1="dk1" bg2="lt2" tx2="dk2" accent1="accent1" accent2="accent2" accent3="accent3" accent4="accent4" accent5="accent5" accent6="accent6" hlink="hlink" folHlink="folHlink"/>
+  <p:notesStyle>
+    <a:lvl1pPr marL="0" algn="l" defTabSz="914400" rtl="0" eaLnBrk="1" latinLnBrk="0" hangingPunct="1">
+      <a:defRPr sz="1200" kern="1200">
+        <a:solidFill>
+          <a:schemeClr val="tx1"/>
+        </a:solidFill>
+        <a:latin typeface="+mn-lt"/>
+        <a:ea typeface="+mn-ea"/>
+        <a:cs typeface="+mn-cs"/>
+      </a:defRPr>
+    </a:lvl1pPr>
+    <a:lvl2pPr marL="457200" algn="l" defTabSz="914400" rtl="0" eaLnBrk="1" latinLnBrk="0" hangingPunct="1">
+      <a:defRPr sz="1200" kern="1200">
+        <a:solidFill>
+          <a:schemeClr val="tx1"/>
+        </a:solidFill>
+        <a:latin typeface="+mn-lt"/>
+        <a:ea typeface="+mn-ea"/>
+        <a:cs typeface="+mn-cs"/>
+      </a:defRPr>
+    </a:lvl2pPr>
+    <a:lvl3pPr marL="914400" algn="l" defTabSz="914400" rtl="0" eaLnBrk="1" latinLnBrk="0" hangingPunct="1">
+      <a:defRPr sz="1200" kern="1200">
+        <a:solidFill>
+          <a:schemeClr val="tx1"/>
+        </a:solidFill>
+        <a:latin typeface="+mn-lt"/>
+        <a:ea typeface="+mn-ea"/>
+        <a:cs typeface="+mn-cs"/>
+      </a:defRPr>
+    </a:lvl3pPr>
+    <a:lvl4pPr marL="1371600" algn="l" defTabSz="914400" rtl="0" eaLnBrk="1" latinLnBrk="0" hangingPunct="1">
+      <a:defRPr sz="1200" kern="1200">
+        <a:solidFill>
+          <a:schemeClr val="tx1"/>
+        </a:solidFill>
+        <a:latin typeface="+mn-lt"/>
+        <a:ea typeface="+mn-ea"/>
+        <a:cs typeface="+mn-cs"/>
+      </a:defRPr>
+    </a:lvl4pPr>
+    <a:lvl5pPr marL="1828800" algn="l" defTabSz="914400" rtl="0" eaLnBrk="1" latinLnBrk="0" hangingPunct="1">
+      <a:defRPr sz="1200" kern="1200">
+        <a:solidFill>
+          <a:schemeClr val="tx1"/>
+        </a:solidFill>
+        <a:latin typeface="+mn-lt"/>
+        <a:ea typeface="+mn-ea"/>
+        <a:cs typeface="+mn-cs"/>
+      </a:defRPr>
+    </a:lvl5pPr>
+    <a:lvl6pPr marL="2286000" algn="l" defTabSz="914400" rtl="0" eaLnBrk="1" latinLnBrk="0" hangingPunct="1">
+      <a:defRPr sz="1200" kern="1200">
+        <a:solidFill>
+          <a:schemeClr val="tx1"/>
+        </a:solidFill>
+        <a:latin typeface="+mn-lt"/>
+        <a:ea typeface="+mn-ea"/>
+        <a:cs typeface="+mn-cs"/>
+      </a:defRPr>
+    </a:lvl6pPr>
+    <a:lvl7pPr marL="2743200" algn="l" defTabSz="914400" rtl="0" eaLnBrk="1" latinLnBrk="0" hangingPunct="1">
+      <a:defRPr sz="1200" kern="1200">
+        <a:solidFill>
+          <a:schemeClr val="tx1"/>
+        </a:solidFill>
+        <a:latin typeface="+mn-lt"/>
+        <a:ea typeface="+mn-ea"/>
+        <a:cs typeface="+mn-cs"/>
+      </a:defRPr>
+    </a:lvl7pPr>
+    <a:lvl8pPr marL="3200400" algn="l" defTabSz="914400" rtl="0" eaLnBrk="1" latinLnBrk="0" hangingPunct="1">
+      <a:defRPr sz="1200" kern="1200">
+        <a:solidFill>
+          <a:schemeClr val="tx1"/>
+        </a:solidFill>
+        <a:latin typeface="+mn-lt"/>
+        <a:ea typeface="+mn-ea"/>
+        <a:cs typeface="+mn-cs"/>
+      </a:defRPr>
+    </a:lvl8pPr>
+    <a:lvl9pPr marL="3657600" algn="l" defTabSz="914400" rtl="0" eaLnBrk="1" latinLnBrk="0" hangingPunct="1">
+      <a:defRPr sz="1200" kern="1200">
+        <a:solidFill>
+          <a:schemeClr val="tx1"/>
+        </a:solidFill>
+        <a:latin typeface="+mn-lt"/>
+        <a:ea typeface="+mn-ea"/>
+        <a:cs typeface="+mn-cs"/>
+      </a:defRPr>
+    </a:lvl9pPr>
+  </p:notesStyle>
+</p:notesMaster>
+</file>
+
+<file path=ppt/notesSlides/notesSlide1.xml><?xml version="1.0" encoding="utf-8"?>
+<p:notes xmlns:a="http://schemas.openxmlformats.org/drawingml/2006/main" xmlns:r="http://schemas.openxmlformats.org/officeDocument/2006/relationships" xmlns:p="http://schemas.openxmlformats.org/presentationml/2006/main">
+  <p:cSld>
+    <p:spTree>
+      <p:nvGrpSpPr>
+        <p:cNvPr id="1" name=""/>
+        <p:cNvGrpSpPr/>
+        <p:nvPr/>
+      </p:nvGrpSpPr>
+      <p:grpSpPr>
+        <a:xfrm>
+          <a:off x="0" y="0"/>
+          <a:ext cx="0" cy="0"/>
+          <a:chOff x="0" y="0"/>
+          <a:chExt cx="0" cy="0"/>
+        </a:xfrm>
+      </p:grpSpPr>
+      <p:sp>
+        <p:nvSpPr>
+          <p:cNvPr id="2" name="Espace réservé de l'image des diapositives 1"/>
+          <p:cNvSpPr>
+            <a:spLocks noGrp="1" noRot="1" noChangeAspect="1"/>
+          </p:cNvSpPr>
+          <p:nvPr>
+            <p:ph type="sldImg"/>
+          </p:nvPr>
+        </p:nvSpPr>
+        <p:spPr/>
+      </p:sp>
+      <p:sp>
+        <p:nvSpPr>
+          <p:cNvPr id="3" name="Espace réservé des commentaires 2"/>
+          <p:cNvSpPr>
+            <a:spLocks noGrp="1"/>
+          </p:cNvSpPr>
+          <p:nvPr>
+            <p:ph type="body" idx="1"/>
+          </p:nvPr>
+        </p:nvSpPr>
+        <p:spPr/>
+        <p:txBody>
+          <a:bodyPr/>
+          <a:lstStyle/>
+          <a:p>
+            <a:endParaRPr lang="fr-FR"/>
+          </a:p>
+        </p:txBody>
+      </p:sp>
+      <p:sp>
+        <p:nvSpPr>
+          <p:cNvPr id="4" name="Espace réservé du numéro de diapositive 3"/>
+          <p:cNvSpPr>
+            <a:spLocks noGrp="1"/>
+          </p:cNvSpPr>
+          <p:nvPr>
+            <p:ph type="sldNum" sz="quarter" idx="10"/>
+          </p:nvPr>
+        </p:nvSpPr>
+        <p:spPr/>
+        <p:txBody>
+          <a:bodyPr/>
+          <a:lstStyle/>
+          <a:p>
+            <a:fld id="{3C22D28A-14A0-4ACF-9A0E-BCD287B65FBA}" type="slidenum">
+              <a:rPr lang="fr-FR" smtClean="0"/>
+              <a:t>2</a:t>
+            </a:fld>
+            <a:endParaRPr lang="fr-FR"/>
+          </a:p>
+        </p:txBody>
+      </p:sp>
+    </p:spTree>
+    <p:extLst>
+      <p:ext uri="{BB962C8B-B14F-4D97-AF65-F5344CB8AC3E}">
+        <p14:creationId xmlns:p14="http://schemas.microsoft.com/office/powerpoint/2010/main" val="1378053720"/>
+      </p:ext>
+    </p:extLst>
+  </p:cSld>
+  <p:clrMapOvr>
+    <a:masterClrMapping/>
+  </p:clrMapOvr>
+</p:notes>
+</file>
+
+<file path=ppt/notesSlides/notesSlide2.xml><?xml version="1.0" encoding="utf-8"?>
+<p:notes xmlns:a="http://schemas.openxmlformats.org/drawingml/2006/main" xmlns:r="http://schemas.openxmlformats.org/officeDocument/2006/relationships" xmlns:p="http://schemas.openxmlformats.org/presentationml/2006/main">
+  <p:cSld>
+    <p:spTree>
+      <p:nvGrpSpPr>
+        <p:cNvPr id="1" name=""/>
+        <p:cNvGrpSpPr/>
+        <p:nvPr/>
+      </p:nvGrpSpPr>
+      <p:grpSpPr>
+        <a:xfrm>
+          <a:off x="0" y="0"/>
+          <a:ext cx="0" cy="0"/>
+          <a:chOff x="0" y="0"/>
+          <a:chExt cx="0" cy="0"/>
+        </a:xfrm>
+      </p:grpSpPr>
+      <p:sp>
+        <p:nvSpPr>
+          <p:cNvPr id="2" name="Espace réservé de l'image des diapositives 1"/>
+          <p:cNvSpPr>
+            <a:spLocks noGrp="1" noRot="1" noChangeAspect="1"/>
+          </p:cNvSpPr>
+          <p:nvPr>
+            <p:ph type="sldImg"/>
+          </p:nvPr>
+        </p:nvSpPr>
+        <p:spPr/>
+      </p:sp>
+      <p:sp>
+        <p:nvSpPr>
+          <p:cNvPr id="3" name="Espace réservé des commentaires 2"/>
+          <p:cNvSpPr>
+            <a:spLocks noGrp="1"/>
+          </p:cNvSpPr>
+          <p:nvPr>
+            <p:ph type="body" idx="1"/>
+          </p:nvPr>
+        </p:nvSpPr>
+        <p:spPr/>
+        <p:txBody>
+          <a:bodyPr/>
+          <a:lstStyle/>
+          <a:p>
+            <a:endParaRPr lang="fr-FR"/>
+          </a:p>
+        </p:txBody>
+      </p:sp>
+      <p:sp>
+        <p:nvSpPr>
+          <p:cNvPr id="4" name="Espace réservé du numéro de diapositive 3"/>
+          <p:cNvSpPr>
+            <a:spLocks noGrp="1"/>
+          </p:cNvSpPr>
+          <p:nvPr>
+            <p:ph type="sldNum" sz="quarter" idx="10"/>
+          </p:nvPr>
+        </p:nvSpPr>
+        <p:spPr/>
+        <p:txBody>
+          <a:bodyPr/>
+          <a:lstStyle/>
+          <a:p>
+            <a:fld id="{3C22D28A-14A0-4ACF-9A0E-BCD287B65FBA}" type="slidenum">
+              <a:rPr lang="fr-FR" smtClean="0"/>
+              <a:t>3</a:t>
+            </a:fld>
+            <a:endParaRPr lang="fr-FR"/>
+          </a:p>
+        </p:txBody>
+      </p:sp>
+    </p:spTree>
+    <p:extLst>
+      <p:ext uri="{BB962C8B-B14F-4D97-AF65-F5344CB8AC3E}">
+        <p14:creationId xmlns:p14="http://schemas.microsoft.com/office/powerpoint/2010/main" val="4238148394"/>
+      </p:ext>
+    </p:extLst>
+  </p:cSld>
+  <p:clrMapOvr>
+    <a:masterClrMapping/>
+  </p:clrMapOvr>
+</p:notes>
 </file>
 
 <file path=ppt/slideLayouts/slideLayout1.xml><?xml version="1.0" encoding="utf-8"?>
@@ -236,7 +764,7 @@
           <a:bodyPr/>
           <a:lstStyle/>
           <a:p>
-            <a:fld id="{DC7A43CA-6E1D-448D-B113-598CFEE67001}" type="datetimeFigureOut">
+            <a:fld id="{5740555B-68ED-40ED-BE0B-E090C62981FC}" type="datetime1">
               <a:rPr lang="fr-FR" smtClean="0"/>
               <a:t>17/03/2016</a:t>
             </a:fld>
@@ -259,7 +787,11 @@
           <a:bodyPr/>
           <a:lstStyle/>
           <a:p>
-            <a:endParaRPr lang="fr-FR"/>
+            <a:r>
+              <a:rPr lang="fr-FR" dirty="0" smtClean="0"/>
+              <a:t>Big Ben</a:t>
+            </a:r>
+            <a:endParaRPr lang="fr-FR" dirty="0"/>
           </a:p>
         </p:txBody>
       </p:sp>
@@ -406,7 +938,7 @@
           <a:bodyPr/>
           <a:lstStyle/>
           <a:p>
-            <a:fld id="{DC7A43CA-6E1D-448D-B113-598CFEE67001}" type="datetimeFigureOut">
+            <a:fld id="{25065E4C-6EB4-4897-B8B1-B320CA0E03B7}" type="datetime1">
               <a:rPr lang="fr-FR" smtClean="0"/>
               <a:t>17/03/2016</a:t>
             </a:fld>
@@ -429,7 +961,11 @@
           <a:bodyPr/>
           <a:lstStyle/>
           <a:p>
-            <a:endParaRPr lang="fr-FR"/>
+            <a:r>
+              <a:rPr lang="fr-FR" dirty="0" smtClean="0"/>
+              <a:t>Big Ben</a:t>
+            </a:r>
+            <a:endParaRPr lang="fr-FR" dirty="0"/>
           </a:p>
         </p:txBody>
       </p:sp>
@@ -586,7 +1122,7 @@
           <a:bodyPr/>
           <a:lstStyle/>
           <a:p>
-            <a:fld id="{DC7A43CA-6E1D-448D-B113-598CFEE67001}" type="datetimeFigureOut">
+            <a:fld id="{336C4305-5D79-4FA3-9E36-EE1FD5B32637}" type="datetime1">
               <a:rPr lang="fr-FR" smtClean="0"/>
               <a:t>17/03/2016</a:t>
             </a:fld>
@@ -609,7 +1145,11 @@
           <a:bodyPr/>
           <a:lstStyle/>
           <a:p>
-            <a:endParaRPr lang="fr-FR"/>
+            <a:r>
+              <a:rPr lang="fr-FR" dirty="0" smtClean="0"/>
+              <a:t>Big Ben</a:t>
+            </a:r>
+            <a:endParaRPr lang="fr-FR" dirty="0"/>
           </a:p>
         </p:txBody>
       </p:sp>
@@ -756,7 +1296,7 @@
           <a:bodyPr/>
           <a:lstStyle/>
           <a:p>
-            <a:fld id="{DC7A43CA-6E1D-448D-B113-598CFEE67001}" type="datetimeFigureOut">
+            <a:fld id="{93939314-6312-475B-813B-202AE836001E}" type="datetime1">
               <a:rPr lang="fr-FR" smtClean="0"/>
               <a:t>17/03/2016</a:t>
             </a:fld>
@@ -779,7 +1319,11 @@
           <a:bodyPr/>
           <a:lstStyle/>
           <a:p>
-            <a:endParaRPr lang="fr-FR"/>
+            <a:r>
+              <a:rPr lang="fr-FR" dirty="0" smtClean="0"/>
+              <a:t>Big Ben</a:t>
+            </a:r>
+            <a:endParaRPr lang="fr-FR" dirty="0"/>
           </a:p>
         </p:txBody>
       </p:sp>
@@ -1002,7 +1546,7 @@
           <a:bodyPr/>
           <a:lstStyle/>
           <a:p>
-            <a:fld id="{DC7A43CA-6E1D-448D-B113-598CFEE67001}" type="datetimeFigureOut">
+            <a:fld id="{5B84B472-07BA-4669-B75E-05628798689A}" type="datetime1">
               <a:rPr lang="fr-FR" smtClean="0"/>
               <a:t>17/03/2016</a:t>
             </a:fld>
@@ -1025,7 +1569,11 @@
           <a:bodyPr/>
           <a:lstStyle/>
           <a:p>
-            <a:endParaRPr lang="fr-FR"/>
+            <a:r>
+              <a:rPr lang="fr-FR" dirty="0" smtClean="0"/>
+              <a:t>Big Ben</a:t>
+            </a:r>
+            <a:endParaRPr lang="fr-FR" dirty="0"/>
           </a:p>
         </p:txBody>
       </p:sp>
@@ -1234,7 +1782,7 @@
           <a:bodyPr/>
           <a:lstStyle/>
           <a:p>
-            <a:fld id="{DC7A43CA-6E1D-448D-B113-598CFEE67001}" type="datetimeFigureOut">
+            <a:fld id="{A4504A64-8DDB-4D49-AD19-435B3080A0D9}" type="datetime1">
               <a:rPr lang="fr-FR" smtClean="0"/>
               <a:t>17/03/2016</a:t>
             </a:fld>
@@ -1257,7 +1805,11 @@
           <a:bodyPr/>
           <a:lstStyle/>
           <a:p>
-            <a:endParaRPr lang="fr-FR"/>
+            <a:r>
+              <a:rPr lang="fr-FR" dirty="0" smtClean="0"/>
+              <a:t>Big Ben</a:t>
+            </a:r>
+            <a:endParaRPr lang="fr-FR" dirty="0"/>
           </a:p>
         </p:txBody>
       </p:sp>
@@ -1601,7 +2153,7 @@
           <a:bodyPr/>
           <a:lstStyle/>
           <a:p>
-            <a:fld id="{DC7A43CA-6E1D-448D-B113-598CFEE67001}" type="datetimeFigureOut">
+            <a:fld id="{495FCF92-D5A9-4E14-956F-1108A454119C}" type="datetime1">
               <a:rPr lang="fr-FR" smtClean="0"/>
               <a:t>17/03/2016</a:t>
             </a:fld>
@@ -1624,7 +2176,11 @@
           <a:bodyPr/>
           <a:lstStyle/>
           <a:p>
-            <a:endParaRPr lang="fr-FR"/>
+            <a:r>
+              <a:rPr lang="fr-FR" dirty="0" smtClean="0"/>
+              <a:t>Big Ben</a:t>
+            </a:r>
+            <a:endParaRPr lang="fr-FR" dirty="0"/>
           </a:p>
         </p:txBody>
       </p:sp>
@@ -1719,7 +2275,7 @@
           <a:bodyPr/>
           <a:lstStyle/>
           <a:p>
-            <a:fld id="{DC7A43CA-6E1D-448D-B113-598CFEE67001}" type="datetimeFigureOut">
+            <a:fld id="{F9DAA3E3-201A-4383-A115-39C35F176B62}" type="datetime1">
               <a:rPr lang="fr-FR" smtClean="0"/>
               <a:t>17/03/2016</a:t>
             </a:fld>
@@ -1742,7 +2298,11 @@
           <a:bodyPr/>
           <a:lstStyle/>
           <a:p>
-            <a:endParaRPr lang="fr-FR"/>
+            <a:r>
+              <a:rPr lang="fr-FR" dirty="0" smtClean="0"/>
+              <a:t>Big Ben</a:t>
+            </a:r>
+            <a:endParaRPr lang="fr-FR" dirty="0"/>
           </a:p>
         </p:txBody>
       </p:sp>
@@ -1814,7 +2374,7 @@
           <a:bodyPr/>
           <a:lstStyle/>
           <a:p>
-            <a:fld id="{DC7A43CA-6E1D-448D-B113-598CFEE67001}" type="datetimeFigureOut">
+            <a:fld id="{81E9144C-0678-4FAC-9A31-E77BD155BB48}" type="datetime1">
               <a:rPr lang="fr-FR" smtClean="0"/>
               <a:t>17/03/2016</a:t>
             </a:fld>
@@ -1837,7 +2397,11 @@
           <a:bodyPr/>
           <a:lstStyle/>
           <a:p>
-            <a:endParaRPr lang="fr-FR"/>
+            <a:r>
+              <a:rPr lang="fr-FR" dirty="0" smtClean="0"/>
+              <a:t>Big Ben</a:t>
+            </a:r>
+            <a:endParaRPr lang="fr-FR" dirty="0"/>
           </a:p>
         </p:txBody>
       </p:sp>
@@ -2091,7 +2655,7 @@
           <a:bodyPr/>
           <a:lstStyle/>
           <a:p>
-            <a:fld id="{DC7A43CA-6E1D-448D-B113-598CFEE67001}" type="datetimeFigureOut">
+            <a:fld id="{D1C60314-110C-4363-AB81-AE9BF74480A6}" type="datetime1">
               <a:rPr lang="fr-FR" smtClean="0"/>
               <a:t>17/03/2016</a:t>
             </a:fld>
@@ -2114,7 +2678,11 @@
           <a:bodyPr/>
           <a:lstStyle/>
           <a:p>
-            <a:endParaRPr lang="fr-FR"/>
+            <a:r>
+              <a:rPr lang="fr-FR" dirty="0" smtClean="0"/>
+              <a:t>Big Ben</a:t>
+            </a:r>
+            <a:endParaRPr lang="fr-FR" dirty="0"/>
           </a:p>
         </p:txBody>
       </p:sp>
@@ -2344,7 +2912,7 @@
           <a:bodyPr/>
           <a:lstStyle/>
           <a:p>
-            <a:fld id="{DC7A43CA-6E1D-448D-B113-598CFEE67001}" type="datetimeFigureOut">
+            <a:fld id="{9E8D6DD4-E69F-4808-A3FF-F98B040A8378}" type="datetime1">
               <a:rPr lang="fr-FR" smtClean="0"/>
               <a:t>17/03/2016</a:t>
             </a:fld>
@@ -2367,7 +2935,11 @@
           <a:bodyPr/>
           <a:lstStyle/>
           <a:p>
-            <a:endParaRPr lang="fr-FR"/>
+            <a:r>
+              <a:rPr lang="fr-FR" dirty="0" smtClean="0"/>
+              <a:t>Big Ben</a:t>
+            </a:r>
+            <a:endParaRPr lang="fr-FR" dirty="0"/>
           </a:p>
         </p:txBody>
       </p:sp>
@@ -2557,7 +3129,7 @@
             </a:lvl1pPr>
           </a:lstStyle>
           <a:p>
-            <a:fld id="{DC7A43CA-6E1D-448D-B113-598CFEE67001}" type="datetimeFigureOut">
+            <a:fld id="{0874334A-139C-4B14-A1AE-36FFFDE7F932}" type="datetime1">
               <a:rPr lang="fr-FR" smtClean="0"/>
               <a:t>17/03/2016</a:t>
             </a:fld>
@@ -2598,7 +3170,11 @@
             </a:lvl1pPr>
           </a:lstStyle>
           <a:p>
-            <a:endParaRPr lang="fr-FR"/>
+            <a:r>
+              <a:rPr lang="fr-FR" dirty="0" smtClean="0"/>
+              <a:t>Big Ben</a:t>
+            </a:r>
+            <a:endParaRPr lang="fr-FR" dirty="0"/>
           </a:p>
         </p:txBody>
       </p:sp>
@@ -2664,6 +3240,7 @@
     <p:sldLayoutId id="2147483658" r:id="rId10"/>
     <p:sldLayoutId id="2147483659" r:id="rId11"/>
   </p:sldLayoutIdLst>
+  <p:hf hdr="0"/>
   <p:txStyles>
     <p:titleStyle>
       <a:lvl1pPr algn="l" defTabSz="914400" rtl="0" eaLnBrk="1" latinLnBrk="0" hangingPunct="1">
@@ -2978,44 +3555,66 @@
           <a:chExt cx="0" cy="0"/>
         </a:xfrm>
       </p:grpSpPr>
-      <p:sp>
-        <p:nvSpPr>
-          <p:cNvPr id="2" name="Titre 1"/>
-          <p:cNvSpPr>
-            <a:spLocks noGrp="1"/>
-          </p:cNvSpPr>
-          <p:nvPr>
-            <p:ph type="ctrTitle"/>
-          </p:nvPr>
-        </p:nvSpPr>
-        <p:spPr/>
-        <p:txBody>
-          <a:bodyPr/>
-          <a:lstStyle/>
-          <a:p>
-            <a:endParaRPr lang="fr-FR" dirty="0"/>
-          </a:p>
-        </p:txBody>
-      </p:sp>
-      <p:sp>
-        <p:nvSpPr>
-          <p:cNvPr id="3" name="Sous-titre 2"/>
-          <p:cNvSpPr>
-            <a:spLocks noGrp="1"/>
-          </p:cNvSpPr>
-          <p:nvPr>
-            <p:ph type="subTitle" idx="1"/>
-          </p:nvPr>
-        </p:nvSpPr>
-        <p:spPr/>
-        <p:txBody>
-          <a:bodyPr/>
-          <a:lstStyle/>
-          <a:p>
-            <a:endParaRPr lang="fr-FR"/>
-          </a:p>
-        </p:txBody>
-      </p:sp>
+      <p:pic>
+        <p:nvPicPr>
+          <p:cNvPr id="4" name="Image 3"/>
+          <p:cNvPicPr>
+            <a:picLocks noChangeAspect="1"/>
+          </p:cNvPicPr>
+          <p:nvPr/>
+        </p:nvPicPr>
+        <p:blipFill>
+          <a:blip r:embed="rId3" cstate="print">
+            <a:extLst>
+              <a:ext uri="{28A0092B-C50C-407E-A947-70E740481C1C}">
+                <a14:useLocalDpi xmlns:a14="http://schemas.microsoft.com/office/drawing/2010/main" val="0"/>
+              </a:ext>
+            </a:extLst>
+          </a:blip>
+          <a:stretch>
+            <a:fillRect/>
+          </a:stretch>
+        </p:blipFill>
+        <p:spPr>
+          <a:xfrm>
+            <a:off x="3346562" y="585432"/>
+            <a:ext cx="6052611" cy="3272893"/>
+          </a:xfrm>
+          <a:prstGeom prst="rect">
+            <a:avLst/>
+          </a:prstGeom>
+        </p:spPr>
+      </p:pic>
+      <p:pic>
+        <p:nvPicPr>
+          <p:cNvPr id="6" name="Image 5"/>
+          <p:cNvPicPr>
+            <a:picLocks noChangeAspect="1"/>
+          </p:cNvPicPr>
+          <p:nvPr/>
+        </p:nvPicPr>
+        <p:blipFill>
+          <a:blip r:embed="rId4" cstate="print">
+            <a:extLst>
+              <a:ext uri="{28A0092B-C50C-407E-A947-70E740481C1C}">
+                <a14:useLocalDpi xmlns:a14="http://schemas.microsoft.com/office/drawing/2010/main" val="0"/>
+              </a:ext>
+            </a:extLst>
+          </a:blip>
+          <a:stretch>
+            <a:fillRect/>
+          </a:stretch>
+        </p:blipFill>
+        <p:spPr>
+          <a:xfrm>
+            <a:off x="2854310" y="5518454"/>
+            <a:ext cx="7037117" cy="1044124"/>
+          </a:xfrm>
+          <a:prstGeom prst="rect">
+            <a:avLst/>
+          </a:prstGeom>
+        </p:spPr>
+      </p:pic>
     </p:spTree>
     <p:extLst>
       <p:ext uri="{BB962C8B-B14F-4D97-AF65-F5344CB8AC3E}">
@@ -3026,6 +3625,387 @@
   <p:clrMapOvr>
     <a:masterClrMapping/>
   </p:clrMapOvr>
+  <mc:AlternateContent xmlns:mc="http://schemas.openxmlformats.org/markup-compatibility/2006">
+    <mc:Choice xmlns:p14="http://schemas.microsoft.com/office/powerpoint/2010/main" Requires="p14">
+      <p:transition spd="slow" p14:dur="3000">
+        <p14:reveal/>
+      </p:transition>
+    </mc:Choice>
+    <mc:Fallback>
+      <p:transition spd="slow">
+        <p:fade/>
+      </p:transition>
+    </mc:Fallback>
+  </mc:AlternateContent>
+  <p:timing>
+    <p:tnLst>
+      <p:par>
+        <p:cTn id="1" dur="indefinite" restart="never" nodeType="tmRoot"/>
+      </p:par>
+    </p:tnLst>
+  </p:timing>
+</p:sld>
+</file>
+
+<file path=ppt/slides/slide2.xml><?xml version="1.0" encoding="utf-8"?>
+<p:sld xmlns:a="http://schemas.openxmlformats.org/drawingml/2006/main" xmlns:r="http://schemas.openxmlformats.org/officeDocument/2006/relationships" xmlns:p="http://schemas.openxmlformats.org/presentationml/2006/main">
+  <p:cSld>
+    <p:bg>
+      <p:bgPr>
+        <a:blipFill dpi="0" rotWithShape="1">
+          <a:blip r:embed="rId3">
+            <a:lum/>
+          </a:blip>
+          <a:srcRect/>
+          <a:stretch>
+            <a:fillRect l="-10000" r="-10000"/>
+          </a:stretch>
+        </a:blipFill>
+        <a:effectLst/>
+      </p:bgPr>
+    </p:bg>
+    <p:spTree>
+      <p:nvGrpSpPr>
+        <p:cNvPr id="1" name=""/>
+        <p:cNvGrpSpPr/>
+        <p:nvPr/>
+      </p:nvGrpSpPr>
+      <p:grpSpPr>
+        <a:xfrm>
+          <a:off x="0" y="0"/>
+          <a:ext cx="0" cy="0"/>
+          <a:chOff x="0" y="0"/>
+          <a:chExt cx="0" cy="0"/>
+        </a:xfrm>
+      </p:grpSpPr>
+      <p:sp>
+        <p:nvSpPr>
+          <p:cNvPr id="5" name="Rectangle 4"/>
+          <p:cNvSpPr/>
+          <p:nvPr/>
+        </p:nvSpPr>
+        <p:spPr>
+          <a:xfrm>
+            <a:off x="1284683" y="575828"/>
+            <a:ext cx="3015569" cy="1200329"/>
+          </a:xfrm>
+          <a:prstGeom prst="rect">
+            <a:avLst/>
+          </a:prstGeom>
+          <a:noFill/>
+          <a:ln>
+            <a:noFill/>
+          </a:ln>
+        </p:spPr>
+        <p:txBody>
+          <a:bodyPr wrap="none" lIns="91440" tIns="45720" rIns="91440" bIns="45720">
+            <a:spAutoFit/>
+          </a:bodyPr>
+          <a:lstStyle/>
+          <a:p>
+            <a:pPr algn="ctr"/>
+            <a:r>
+              <a:rPr lang="en-GB" sz="7200" b="1" cap="none" spc="0" dirty="0" smtClean="0">
+                <a:ln w="10160">
+                  <a:solidFill>
+                    <a:schemeClr val="accent5"/>
+                  </a:solidFill>
+                  <a:prstDash val="solid"/>
+                </a:ln>
+                <a:solidFill>
+                  <a:srgbClr val="FFFFFF"/>
+                </a:solidFill>
+                <a:effectLst>
+                  <a:outerShdw blurRad="38100" dist="22860" dir="5400000" algn="tl" rotWithShape="0">
+                    <a:srgbClr val="000000">
+                      <a:alpha val="30000"/>
+                    </a:srgbClr>
+                  </a:outerShdw>
+                </a:effectLst>
+                <a:latin typeface="BadaBoom BB" panose="020B0603050302020204" pitchFamily="34" charset="0"/>
+              </a:rPr>
+              <a:t>Outlines</a:t>
+            </a:r>
+            <a:endParaRPr lang="en-GB" sz="7200" b="1" cap="none" spc="0" dirty="0">
+              <a:ln w="10160">
+                <a:solidFill>
+                  <a:schemeClr val="accent5"/>
+                </a:solidFill>
+                <a:prstDash val="solid"/>
+              </a:ln>
+              <a:solidFill>
+                <a:srgbClr val="FFFFFF"/>
+              </a:solidFill>
+              <a:effectLst>
+                <a:outerShdw blurRad="38100" dist="22860" dir="5400000" algn="tl" rotWithShape="0">
+                  <a:srgbClr val="000000">
+                    <a:alpha val="30000"/>
+                  </a:srgbClr>
+                </a:outerShdw>
+              </a:effectLst>
+              <a:latin typeface="BadaBoom BB" panose="020B0603050302020204" pitchFamily="34" charset="0"/>
+            </a:endParaRPr>
+          </a:p>
+        </p:txBody>
+      </p:sp>
+      <p:sp>
+        <p:nvSpPr>
+          <p:cNvPr id="6" name="Espace réservé de la date 5"/>
+          <p:cNvSpPr>
+            <a:spLocks noGrp="1"/>
+          </p:cNvSpPr>
+          <p:nvPr>
+            <p:ph type="dt" sz="half" idx="10"/>
+          </p:nvPr>
+        </p:nvSpPr>
+        <p:spPr/>
+        <p:txBody>
+          <a:bodyPr/>
+          <a:lstStyle/>
+          <a:p>
+            <a:fld id="{1D42B496-28C6-43F1-AA5E-DCEC283D924C}" type="datetime1">
+              <a:rPr lang="fr-FR" smtClean="0">
+                <a:solidFill>
+                  <a:schemeClr val="bg1"/>
+                </a:solidFill>
+              </a:rPr>
+              <a:t>17/03/2016</a:t>
+            </a:fld>
+            <a:endParaRPr lang="fr-FR" dirty="0">
+              <a:solidFill>
+                <a:schemeClr val="bg1"/>
+              </a:solidFill>
+            </a:endParaRPr>
+          </a:p>
+        </p:txBody>
+      </p:sp>
+      <p:sp>
+        <p:nvSpPr>
+          <p:cNvPr id="7" name="Espace réservé du pied de page 6"/>
+          <p:cNvSpPr>
+            <a:spLocks noGrp="1"/>
+          </p:cNvSpPr>
+          <p:nvPr>
+            <p:ph type="ftr" sz="quarter" idx="11"/>
+          </p:nvPr>
+        </p:nvSpPr>
+        <p:spPr/>
+        <p:txBody>
+          <a:bodyPr/>
+          <a:lstStyle/>
+          <a:p>
+            <a:r>
+              <a:rPr lang="fr-FR" sz="2400" dirty="0" smtClean="0">
+                <a:solidFill>
+                  <a:schemeClr val="bg1"/>
+                </a:solidFill>
+                <a:latin typeface="BadaBoom BB" panose="020B0603050302020204" pitchFamily="34" charset="0"/>
+              </a:rPr>
+              <a:t>Big Ben</a:t>
+            </a:r>
+            <a:endParaRPr lang="fr-FR" sz="2400" dirty="0">
+              <a:solidFill>
+                <a:schemeClr val="bg1"/>
+              </a:solidFill>
+              <a:latin typeface="BadaBoom BB" panose="020B0603050302020204" pitchFamily="34" charset="0"/>
+            </a:endParaRPr>
+          </a:p>
+        </p:txBody>
+      </p:sp>
+      <p:sp>
+        <p:nvSpPr>
+          <p:cNvPr id="8" name="Espace réservé du numéro de diapositive 7"/>
+          <p:cNvSpPr>
+            <a:spLocks noGrp="1"/>
+          </p:cNvSpPr>
+          <p:nvPr>
+            <p:ph type="sldNum" sz="quarter" idx="12"/>
+          </p:nvPr>
+        </p:nvSpPr>
+        <p:spPr/>
+        <p:txBody>
+          <a:bodyPr/>
+          <a:lstStyle/>
+          <a:p>
+            <a:fld id="{D347F7E7-DA46-45CC-ACCA-4679FD1F5CF6}" type="slidenum">
+              <a:rPr lang="fr-FR" smtClean="0">
+                <a:solidFill>
+                  <a:schemeClr val="bg1"/>
+                </a:solidFill>
+              </a:rPr>
+              <a:t>2</a:t>
+            </a:fld>
+            <a:endParaRPr lang="fr-FR" dirty="0">
+              <a:solidFill>
+                <a:schemeClr val="bg1"/>
+              </a:solidFill>
+            </a:endParaRPr>
+          </a:p>
+        </p:txBody>
+      </p:sp>
+    </p:spTree>
+    <p:extLst>
+      <p:ext uri="{BB962C8B-B14F-4D97-AF65-F5344CB8AC3E}">
+        <p14:creationId xmlns:p14="http://schemas.microsoft.com/office/powerpoint/2010/main" val="1389692358"/>
+      </p:ext>
+    </p:extLst>
+  </p:cSld>
+  <p:clrMapOvr>
+    <a:masterClrMapping/>
+  </p:clrMapOvr>
+  <p:timing>
+    <p:tnLst>
+      <p:par>
+        <p:cTn id="1" dur="indefinite" restart="never" nodeType="tmRoot"/>
+      </p:par>
+    </p:tnLst>
+  </p:timing>
+</p:sld>
+</file>
+
+<file path=ppt/slides/slide3.xml><?xml version="1.0" encoding="utf-8"?>
+<p:sld xmlns:a="http://schemas.openxmlformats.org/drawingml/2006/main" xmlns:r="http://schemas.openxmlformats.org/officeDocument/2006/relationships" xmlns:p="http://schemas.openxmlformats.org/presentationml/2006/main">
+  <p:cSld>
+    <p:bg>
+      <p:bgPr>
+        <a:blipFill dpi="0" rotWithShape="1">
+          <a:blip r:embed="rId3">
+            <a:lum/>
+          </a:blip>
+          <a:srcRect/>
+          <a:stretch>
+            <a:fillRect l="-10000" r="-10000"/>
+          </a:stretch>
+        </a:blipFill>
+        <a:effectLst/>
+      </p:bgPr>
+    </p:bg>
+    <p:spTree>
+      <p:nvGrpSpPr>
+        <p:cNvPr id="1" name=""/>
+        <p:cNvGrpSpPr/>
+        <p:nvPr/>
+      </p:nvGrpSpPr>
+      <p:grpSpPr>
+        <a:xfrm>
+          <a:off x="0" y="0"/>
+          <a:ext cx="0" cy="0"/>
+          <a:chOff x="0" y="0"/>
+          <a:chExt cx="0" cy="0"/>
+        </a:xfrm>
+      </p:grpSpPr>
+      <p:sp>
+        <p:nvSpPr>
+          <p:cNvPr id="6" name="Espace réservé de la date 5"/>
+          <p:cNvSpPr>
+            <a:spLocks noGrp="1"/>
+          </p:cNvSpPr>
+          <p:nvPr>
+            <p:ph type="dt" sz="half" idx="10"/>
+          </p:nvPr>
+        </p:nvSpPr>
+        <p:spPr/>
+        <p:txBody>
+          <a:bodyPr/>
+          <a:lstStyle/>
+          <a:p>
+            <a:fld id="{1D42B496-28C6-43F1-AA5E-DCEC283D924C}" type="datetime1">
+              <a:rPr lang="fr-FR" smtClean="0">
+                <a:solidFill>
+                  <a:schemeClr val="bg1"/>
+                </a:solidFill>
+              </a:rPr>
+              <a:t>17/03/2016</a:t>
+            </a:fld>
+            <a:endParaRPr lang="fr-FR" dirty="0">
+              <a:solidFill>
+                <a:schemeClr val="bg1"/>
+              </a:solidFill>
+            </a:endParaRPr>
+          </a:p>
+        </p:txBody>
+      </p:sp>
+      <p:sp>
+        <p:nvSpPr>
+          <p:cNvPr id="7" name="Espace réservé du pied de page 6"/>
+          <p:cNvSpPr>
+            <a:spLocks noGrp="1"/>
+          </p:cNvSpPr>
+          <p:nvPr>
+            <p:ph type="ftr" sz="quarter" idx="11"/>
+          </p:nvPr>
+        </p:nvSpPr>
+        <p:spPr/>
+        <p:txBody>
+          <a:bodyPr/>
+          <a:lstStyle/>
+          <a:p>
+            <a:r>
+              <a:rPr lang="fr-FR" sz="2400" dirty="0" smtClean="0">
+                <a:solidFill>
+                  <a:schemeClr val="bg1"/>
+                </a:solidFill>
+                <a:latin typeface="BadaBoom BB" panose="020B0603050302020204" pitchFamily="34" charset="0"/>
+              </a:rPr>
+              <a:t>Big Ben</a:t>
+            </a:r>
+            <a:endParaRPr lang="fr-FR" sz="2400" dirty="0">
+              <a:solidFill>
+                <a:schemeClr val="bg1"/>
+              </a:solidFill>
+              <a:latin typeface="BadaBoom BB" panose="020B0603050302020204" pitchFamily="34" charset="0"/>
+            </a:endParaRPr>
+          </a:p>
+        </p:txBody>
+      </p:sp>
+      <p:sp>
+        <p:nvSpPr>
+          <p:cNvPr id="8" name="Espace réservé du numéro de diapositive 7"/>
+          <p:cNvSpPr>
+            <a:spLocks noGrp="1"/>
+          </p:cNvSpPr>
+          <p:nvPr>
+            <p:ph type="sldNum" sz="quarter" idx="12"/>
+          </p:nvPr>
+        </p:nvSpPr>
+        <p:spPr/>
+        <p:txBody>
+          <a:bodyPr/>
+          <a:lstStyle/>
+          <a:p>
+            <a:fld id="{D347F7E7-DA46-45CC-ACCA-4679FD1F5CF6}" type="slidenum">
+              <a:rPr lang="fr-FR" smtClean="0">
+                <a:solidFill>
+                  <a:schemeClr val="bg1"/>
+                </a:solidFill>
+              </a:rPr>
+              <a:t>3</a:t>
+            </a:fld>
+            <a:endParaRPr lang="fr-FR" dirty="0">
+              <a:solidFill>
+                <a:schemeClr val="bg1"/>
+              </a:solidFill>
+            </a:endParaRPr>
+          </a:p>
+        </p:txBody>
+      </p:sp>
+    </p:spTree>
+    <p:extLst>
+      <p:ext uri="{BB962C8B-B14F-4D97-AF65-F5344CB8AC3E}">
+        <p14:creationId xmlns:p14="http://schemas.microsoft.com/office/powerpoint/2010/main" val="1942635360"/>
+      </p:ext>
+    </p:extLst>
+  </p:cSld>
+  <p:clrMapOvr>
+    <a:masterClrMapping/>
+  </p:clrMapOvr>
+  <p:timing>
+    <p:tnLst>
+      <p:par>
+        <p:cTn id="1" dur="indefinite" restart="never" nodeType="tmRoot"/>
+      </p:par>
+    </p:tnLst>
+  </p:timing>
 </p:sld>
 </file>
 
@@ -3288,4 +4268,265 @@
     </a:ext>
   </a:extLst>
 </a:theme>
+</file>
+
+<file path=ppt/theme/theme2.xml><?xml version="1.0" encoding="utf-8"?>
+<a:theme xmlns:a="http://schemas.openxmlformats.org/drawingml/2006/main" name="Thème Office">
+  <a:themeElements>
+    <a:clrScheme name="Office">
+      <a:dk1>
+        <a:sysClr val="windowText" lastClr="000000"/>
+      </a:dk1>
+      <a:lt1>
+        <a:sysClr val="window" lastClr="FFFFFF"/>
+      </a:lt1>
+      <a:dk2>
+        <a:srgbClr val="44546A"/>
+      </a:dk2>
+      <a:lt2>
+        <a:srgbClr val="E7E6E6"/>
+      </a:lt2>
+      <a:accent1>
+        <a:srgbClr val="5B9BD5"/>
+      </a:accent1>
+      <a:accent2>
+        <a:srgbClr val="ED7D31"/>
+      </a:accent2>
+      <a:accent3>
+        <a:srgbClr val="A5A5A5"/>
+      </a:accent3>
+      <a:accent4>
+        <a:srgbClr val="FFC000"/>
+      </a:accent4>
+      <a:accent5>
+        <a:srgbClr val="4472C4"/>
+      </a:accent5>
+      <a:accent6>
+        <a:srgbClr val="70AD47"/>
+      </a:accent6>
+      <a:hlink>
+        <a:srgbClr val="0563C1"/>
+      </a:hlink>
+      <a:folHlink>
+        <a:srgbClr val="954F72"/>
+      </a:folHlink>
+    </a:clrScheme>
+    <a:fontScheme name="Office">
+      <a:majorFont>
+        <a:latin typeface="Calibri Light" panose="020F0302020204030204"/>
+        <a:ea typeface=""/>
+        <a:cs typeface=""/>
+        <a:font script="Jpan" typeface="ＭＳ Ｐゴシック"/>
+        <a:font script="Hang" typeface="맑은 고딕"/>
+        <a:font script="Hans" typeface="宋体"/>
+        <a:font script="Hant" typeface="新細明體"/>
+        <a:font script="Arab" typeface="Times New Roman"/>
+        <a:font script="Hebr" typeface="Times New Roman"/>
+        <a:font script="Thai" typeface="Angsana New"/>
+        <a:font script="Ethi" typeface="Nyala"/>
+        <a:font script="Beng" typeface="Vrinda"/>
+        <a:font script="Gujr" typeface="Shruti"/>
+        <a:font script="Khmr" typeface="MoolBoran"/>
+        <a:font script="Knda" typeface="Tunga"/>
+        <a:font script="Guru" typeface="Raavi"/>
+        <a:font script="Cans" typeface="Euphemia"/>
+        <a:font script="Cher" typeface="Plantagenet Cherokee"/>
+        <a:font script="Yiii" typeface="Microsoft Yi Baiti"/>
+        <a:font script="Tibt" typeface="Microsoft Himalaya"/>
+        <a:font script="Thaa" typeface="MV Boli"/>
+        <a:font script="Deva" typeface="Mangal"/>
+        <a:font script="Telu" typeface="Gautami"/>
+        <a:font script="Taml" typeface="Latha"/>
+        <a:font script="Syrc" typeface="Estrangelo Edessa"/>
+        <a:font script="Orya" typeface="Kalinga"/>
+        <a:font script="Mlym" typeface="Kartika"/>
+        <a:font script="Laoo" typeface="DokChampa"/>
+        <a:font script="Sinh" typeface="Iskoola Pota"/>
+        <a:font script="Mong" typeface="Mongolian Baiti"/>
+        <a:font script="Viet" typeface="Times New Roman"/>
+        <a:font script="Uigh" typeface="Microsoft Uighur"/>
+        <a:font script="Geor" typeface="Sylfaen"/>
+      </a:majorFont>
+      <a:minorFont>
+        <a:latin typeface="Calibri" panose="020F0502020204030204"/>
+        <a:ea typeface=""/>
+        <a:cs typeface=""/>
+        <a:font script="Jpan" typeface="ＭＳ Ｐゴシック"/>
+        <a:font script="Hang" typeface="맑은 고딕"/>
+        <a:font script="Hans" typeface="宋体"/>
+        <a:font script="Hant" typeface="新細明體"/>
+        <a:font script="Arab" typeface="Arial"/>
+        <a:font script="Hebr" typeface="Arial"/>
+        <a:font script="Thai" typeface="Cordia New"/>
+        <a:font script="Ethi" typeface="Nyala"/>
+        <a:font script="Beng" typeface="Vrinda"/>
+        <a:font script="Gujr" typeface="Shruti"/>
+        <a:font script="Khmr" typeface="DaunPenh"/>
+        <a:font script="Knda" typeface="Tunga"/>
+        <a:font script="Guru" typeface="Raavi"/>
+        <a:font script="Cans" typeface="Euphemia"/>
+        <a:font script="Cher" typeface="Plantagenet Cherokee"/>
+        <a:font script="Yiii" typeface="Microsoft Yi Baiti"/>
+        <a:font script="Tibt" typeface="Microsoft Himalaya"/>
+        <a:font script="Thaa" typeface="MV Boli"/>
+        <a:font script="Deva" typeface="Mangal"/>
+        <a:font script="Telu" typeface="Gautami"/>
+        <a:font script="Taml" typeface="Latha"/>
+        <a:font script="Syrc" typeface="Estrangelo Edessa"/>
+        <a:font script="Orya" typeface="Kalinga"/>
+        <a:font script="Mlym" typeface="Kartika"/>
+        <a:font script="Laoo" typeface="DokChampa"/>
+        <a:font script="Sinh" typeface="Iskoola Pota"/>
+        <a:font script="Mong" typeface="Mongolian Baiti"/>
+        <a:font script="Viet" typeface="Arial"/>
+        <a:font script="Uigh" typeface="Microsoft Uighur"/>
+        <a:font script="Geor" typeface="Sylfaen"/>
+      </a:minorFont>
+    </a:fontScheme>
+    <a:fmtScheme name="Office">
+      <a:fillStyleLst>
+        <a:solidFill>
+          <a:schemeClr val="phClr"/>
+        </a:solidFill>
+        <a:gradFill rotWithShape="1">
+          <a:gsLst>
+            <a:gs pos="0">
+              <a:schemeClr val="phClr">
+                <a:lumMod val="110000"/>
+                <a:satMod val="105000"/>
+                <a:tint val="67000"/>
+              </a:schemeClr>
+            </a:gs>
+            <a:gs pos="50000">
+              <a:schemeClr val="phClr">
+                <a:lumMod val="105000"/>
+                <a:satMod val="103000"/>
+                <a:tint val="73000"/>
+              </a:schemeClr>
+            </a:gs>
+            <a:gs pos="100000">
+              <a:schemeClr val="phClr">
+                <a:lumMod val="105000"/>
+                <a:satMod val="109000"/>
+                <a:tint val="81000"/>
+              </a:schemeClr>
+            </a:gs>
+          </a:gsLst>
+          <a:lin ang="5400000" scaled="0"/>
+        </a:gradFill>
+        <a:gradFill rotWithShape="1">
+          <a:gsLst>
+            <a:gs pos="0">
+              <a:schemeClr val="phClr">
+                <a:satMod val="103000"/>
+                <a:lumMod val="102000"/>
+                <a:tint val="94000"/>
+              </a:schemeClr>
+            </a:gs>
+            <a:gs pos="50000">
+              <a:schemeClr val="phClr">
+                <a:satMod val="110000"/>
+                <a:lumMod val="100000"/>
+                <a:shade val="100000"/>
+              </a:schemeClr>
+            </a:gs>
+            <a:gs pos="100000">
+              <a:schemeClr val="phClr">
+                <a:lumMod val="99000"/>
+                <a:satMod val="120000"/>
+                <a:shade val="78000"/>
+              </a:schemeClr>
+            </a:gs>
+          </a:gsLst>
+          <a:lin ang="5400000" scaled="0"/>
+        </a:gradFill>
+      </a:fillStyleLst>
+      <a:lnStyleLst>
+        <a:ln w="6350" cap="flat" cmpd="sng" algn="ctr">
+          <a:solidFill>
+            <a:schemeClr val="phClr"/>
+          </a:solidFill>
+          <a:prstDash val="solid"/>
+          <a:miter lim="800000"/>
+        </a:ln>
+        <a:ln w="12700" cap="flat" cmpd="sng" algn="ctr">
+          <a:solidFill>
+            <a:schemeClr val="phClr"/>
+          </a:solidFill>
+          <a:prstDash val="solid"/>
+          <a:miter lim="800000"/>
+        </a:ln>
+        <a:ln w="19050" cap="flat" cmpd="sng" algn="ctr">
+          <a:solidFill>
+            <a:schemeClr val="phClr"/>
+          </a:solidFill>
+          <a:prstDash val="solid"/>
+          <a:miter lim="800000"/>
+        </a:ln>
+      </a:lnStyleLst>
+      <a:effectStyleLst>
+        <a:effectStyle>
+          <a:effectLst/>
+        </a:effectStyle>
+        <a:effectStyle>
+          <a:effectLst/>
+        </a:effectStyle>
+        <a:effectStyle>
+          <a:effectLst>
+            <a:outerShdw blurRad="57150" dist="19050" dir="5400000" algn="ctr" rotWithShape="0">
+              <a:srgbClr val="000000">
+                <a:alpha val="63000"/>
+              </a:srgbClr>
+            </a:outerShdw>
+          </a:effectLst>
+        </a:effectStyle>
+      </a:effectStyleLst>
+      <a:bgFillStyleLst>
+        <a:solidFill>
+          <a:schemeClr val="phClr"/>
+        </a:solidFill>
+        <a:solidFill>
+          <a:schemeClr val="phClr">
+            <a:tint val="95000"/>
+            <a:satMod val="170000"/>
+          </a:schemeClr>
+        </a:solidFill>
+        <a:gradFill rotWithShape="1">
+          <a:gsLst>
+            <a:gs pos="0">
+              <a:schemeClr val="phClr">
+                <a:tint val="93000"/>
+                <a:satMod val="150000"/>
+                <a:shade val="98000"/>
+                <a:lumMod val="102000"/>
+              </a:schemeClr>
+            </a:gs>
+            <a:gs pos="50000">
+              <a:schemeClr val="phClr">
+                <a:tint val="98000"/>
+                <a:satMod val="130000"/>
+                <a:shade val="90000"/>
+                <a:lumMod val="103000"/>
+              </a:schemeClr>
+            </a:gs>
+            <a:gs pos="100000">
+              <a:schemeClr val="phClr">
+                <a:shade val="63000"/>
+                <a:satMod val="120000"/>
+              </a:schemeClr>
+            </a:gs>
+          </a:gsLst>
+          <a:lin ang="5400000" scaled="0"/>
+        </a:gradFill>
+      </a:bgFillStyleLst>
+    </a:fmtScheme>
+  </a:themeElements>
+  <a:objectDefaults/>
+  <a:extraClrSchemeLst/>
+  <a:extLst>
+    <a:ext uri="{05A4C25C-085E-4340-85A3-A5531E510DB2}">
+      <thm15:themeFamily xmlns:thm15="http://schemas.microsoft.com/office/thememl/2012/main" name="Office Theme" id="{62F939B6-93AF-4DB8-9C6B-D6C7DFDC589F}" vid="{4A3C46E8-61CC-4603-A589-7422A47A8E4A}"/>
+    </a:ext>
+  </a:extLst>
+</a:theme>
 </file>
</xml_diff>

<commit_message>
PPt + 50:50 back
</commit_message>
<xml_diff>
--- a/Presentation.pptx
+++ b/Presentation.pptx
@@ -5,13 +5,15 @@
     <p:sldMasterId id="2147483648" r:id="rId1"/>
   </p:sldMasterIdLst>
   <p:notesMasterIdLst>
-    <p:notesMasterId r:id="rId6"/>
+    <p:notesMasterId r:id="rId8"/>
   </p:notesMasterIdLst>
   <p:sldIdLst>
     <p:sldId id="256" r:id="rId2"/>
     <p:sldId id="257" r:id="rId3"/>
-    <p:sldId id="258" r:id="rId4"/>
-    <p:sldId id="259" r:id="rId5"/>
+    <p:sldId id="260" r:id="rId4"/>
+    <p:sldId id="258" r:id="rId5"/>
+    <p:sldId id="261" r:id="rId6"/>
+    <p:sldId id="259" r:id="rId7"/>
   </p:sldIdLst>
   <p:sldSz cx="12192000" cy="6858000"/>
   <p:notesSz cx="6858000" cy="9144000"/>
@@ -200,7 +202,7 @@
           <a:p>
             <a:fld id="{3C783A4A-DA22-4EFB-AF01-108B39BE77A0}" type="datetimeFigureOut">
               <a:rPr lang="fr-FR" smtClean="0"/>
-              <a:t>17/03/2016</a:t>
+              <a:t>18/03/2016</a:t>
             </a:fld>
             <a:endParaRPr lang="fr-FR"/>
           </a:p>
@@ -626,7 +628,7 @@
     </p:spTree>
     <p:extLst>
       <p:ext uri="{BB962C8B-B14F-4D97-AF65-F5344CB8AC3E}">
-        <p14:creationId xmlns:p14="http://schemas.microsoft.com/office/powerpoint/2010/main" val="4238148394"/>
+        <p14:creationId xmlns:p14="http://schemas.microsoft.com/office/powerpoint/2010/main" val="2175333569"/>
       </p:ext>
     </p:extLst>
   </p:cSld>
@@ -702,6 +704,174 @@
             <a:fld id="{3C22D28A-14A0-4ACF-9A0E-BCD287B65FBA}" type="slidenum">
               <a:rPr lang="fr-FR" smtClean="0"/>
               <a:t>4</a:t>
+            </a:fld>
+            <a:endParaRPr lang="fr-FR"/>
+          </a:p>
+        </p:txBody>
+      </p:sp>
+    </p:spTree>
+    <p:extLst>
+      <p:ext uri="{BB962C8B-B14F-4D97-AF65-F5344CB8AC3E}">
+        <p14:creationId xmlns:p14="http://schemas.microsoft.com/office/powerpoint/2010/main" val="4238148394"/>
+      </p:ext>
+    </p:extLst>
+  </p:cSld>
+  <p:clrMapOvr>
+    <a:masterClrMapping/>
+  </p:clrMapOvr>
+</p:notes>
+</file>
+
+<file path=ppt/notesSlides/notesSlide4.xml><?xml version="1.0" encoding="utf-8"?>
+<p:notes xmlns:a="http://schemas.openxmlformats.org/drawingml/2006/main" xmlns:r="http://schemas.openxmlformats.org/officeDocument/2006/relationships" xmlns:p="http://schemas.openxmlformats.org/presentationml/2006/main">
+  <p:cSld>
+    <p:spTree>
+      <p:nvGrpSpPr>
+        <p:cNvPr id="1" name=""/>
+        <p:cNvGrpSpPr/>
+        <p:nvPr/>
+      </p:nvGrpSpPr>
+      <p:grpSpPr>
+        <a:xfrm>
+          <a:off x="0" y="0"/>
+          <a:ext cx="0" cy="0"/>
+          <a:chOff x="0" y="0"/>
+          <a:chExt cx="0" cy="0"/>
+        </a:xfrm>
+      </p:grpSpPr>
+      <p:sp>
+        <p:nvSpPr>
+          <p:cNvPr id="2" name="Espace réservé de l'image des diapositives 1"/>
+          <p:cNvSpPr>
+            <a:spLocks noGrp="1" noRot="1" noChangeAspect="1"/>
+          </p:cNvSpPr>
+          <p:nvPr>
+            <p:ph type="sldImg"/>
+          </p:nvPr>
+        </p:nvSpPr>
+        <p:spPr/>
+      </p:sp>
+      <p:sp>
+        <p:nvSpPr>
+          <p:cNvPr id="3" name="Espace réservé des commentaires 2"/>
+          <p:cNvSpPr>
+            <a:spLocks noGrp="1"/>
+          </p:cNvSpPr>
+          <p:nvPr>
+            <p:ph type="body" idx="1"/>
+          </p:nvPr>
+        </p:nvSpPr>
+        <p:spPr/>
+        <p:txBody>
+          <a:bodyPr/>
+          <a:lstStyle/>
+          <a:p>
+            <a:endParaRPr lang="fr-FR"/>
+          </a:p>
+        </p:txBody>
+      </p:sp>
+      <p:sp>
+        <p:nvSpPr>
+          <p:cNvPr id="4" name="Espace réservé du numéro de diapositive 3"/>
+          <p:cNvSpPr>
+            <a:spLocks noGrp="1"/>
+          </p:cNvSpPr>
+          <p:nvPr>
+            <p:ph type="sldNum" sz="quarter" idx="10"/>
+          </p:nvPr>
+        </p:nvSpPr>
+        <p:spPr/>
+        <p:txBody>
+          <a:bodyPr/>
+          <a:lstStyle/>
+          <a:p>
+            <a:fld id="{3C22D28A-14A0-4ACF-9A0E-BCD287B65FBA}" type="slidenum">
+              <a:rPr lang="fr-FR" smtClean="0"/>
+              <a:t>5</a:t>
+            </a:fld>
+            <a:endParaRPr lang="fr-FR"/>
+          </a:p>
+        </p:txBody>
+      </p:sp>
+    </p:spTree>
+    <p:extLst>
+      <p:ext uri="{BB962C8B-B14F-4D97-AF65-F5344CB8AC3E}">
+        <p14:creationId xmlns:p14="http://schemas.microsoft.com/office/powerpoint/2010/main" val="2928593008"/>
+      </p:ext>
+    </p:extLst>
+  </p:cSld>
+  <p:clrMapOvr>
+    <a:masterClrMapping/>
+  </p:clrMapOvr>
+</p:notes>
+</file>
+
+<file path=ppt/notesSlides/notesSlide5.xml><?xml version="1.0" encoding="utf-8"?>
+<p:notes xmlns:a="http://schemas.openxmlformats.org/drawingml/2006/main" xmlns:r="http://schemas.openxmlformats.org/officeDocument/2006/relationships" xmlns:p="http://schemas.openxmlformats.org/presentationml/2006/main">
+  <p:cSld>
+    <p:spTree>
+      <p:nvGrpSpPr>
+        <p:cNvPr id="1" name=""/>
+        <p:cNvGrpSpPr/>
+        <p:nvPr/>
+      </p:nvGrpSpPr>
+      <p:grpSpPr>
+        <a:xfrm>
+          <a:off x="0" y="0"/>
+          <a:ext cx="0" cy="0"/>
+          <a:chOff x="0" y="0"/>
+          <a:chExt cx="0" cy="0"/>
+        </a:xfrm>
+      </p:grpSpPr>
+      <p:sp>
+        <p:nvSpPr>
+          <p:cNvPr id="2" name="Espace réservé de l'image des diapositives 1"/>
+          <p:cNvSpPr>
+            <a:spLocks noGrp="1" noRot="1" noChangeAspect="1"/>
+          </p:cNvSpPr>
+          <p:nvPr>
+            <p:ph type="sldImg"/>
+          </p:nvPr>
+        </p:nvSpPr>
+        <p:spPr/>
+      </p:sp>
+      <p:sp>
+        <p:nvSpPr>
+          <p:cNvPr id="3" name="Espace réservé des commentaires 2"/>
+          <p:cNvSpPr>
+            <a:spLocks noGrp="1"/>
+          </p:cNvSpPr>
+          <p:nvPr>
+            <p:ph type="body" idx="1"/>
+          </p:nvPr>
+        </p:nvSpPr>
+        <p:spPr/>
+        <p:txBody>
+          <a:bodyPr/>
+          <a:lstStyle/>
+          <a:p>
+            <a:endParaRPr lang="fr-FR"/>
+          </a:p>
+        </p:txBody>
+      </p:sp>
+      <p:sp>
+        <p:nvSpPr>
+          <p:cNvPr id="4" name="Espace réservé du numéro de diapositive 3"/>
+          <p:cNvSpPr>
+            <a:spLocks noGrp="1"/>
+          </p:cNvSpPr>
+          <p:nvPr>
+            <p:ph type="sldNum" sz="quarter" idx="10"/>
+          </p:nvPr>
+        </p:nvSpPr>
+        <p:spPr/>
+        <p:txBody>
+          <a:bodyPr/>
+          <a:lstStyle/>
+          <a:p>
+            <a:fld id="{3C22D28A-14A0-4ACF-9A0E-BCD287B65FBA}" type="slidenum">
+              <a:rPr lang="fr-FR" smtClean="0"/>
+              <a:t>6</a:t>
             </a:fld>
             <a:endParaRPr lang="fr-FR"/>
           </a:p>
@@ -851,7 +1021,7 @@
           <a:p>
             <a:fld id="{5740555B-68ED-40ED-BE0B-E090C62981FC}" type="datetime1">
               <a:rPr lang="fr-FR" smtClean="0"/>
-              <a:t>17/03/2016</a:t>
+              <a:t>18/03/2016</a:t>
             </a:fld>
             <a:endParaRPr lang="fr-FR"/>
           </a:p>
@@ -1025,7 +1195,7 @@
           <a:p>
             <a:fld id="{25065E4C-6EB4-4897-B8B1-B320CA0E03B7}" type="datetime1">
               <a:rPr lang="fr-FR" smtClean="0"/>
-              <a:t>17/03/2016</a:t>
+              <a:t>18/03/2016</a:t>
             </a:fld>
             <a:endParaRPr lang="fr-FR"/>
           </a:p>
@@ -1209,7 +1379,7 @@
           <a:p>
             <a:fld id="{336C4305-5D79-4FA3-9E36-EE1FD5B32637}" type="datetime1">
               <a:rPr lang="fr-FR" smtClean="0"/>
-              <a:t>17/03/2016</a:t>
+              <a:t>18/03/2016</a:t>
             </a:fld>
             <a:endParaRPr lang="fr-FR"/>
           </a:p>
@@ -1383,7 +1553,7 @@
           <a:p>
             <a:fld id="{93939314-6312-475B-813B-202AE836001E}" type="datetime1">
               <a:rPr lang="fr-FR" smtClean="0"/>
-              <a:t>17/03/2016</a:t>
+              <a:t>18/03/2016</a:t>
             </a:fld>
             <a:endParaRPr lang="fr-FR"/>
           </a:p>
@@ -1633,7 +1803,7 @@
           <a:p>
             <a:fld id="{5B84B472-07BA-4669-B75E-05628798689A}" type="datetime1">
               <a:rPr lang="fr-FR" smtClean="0"/>
-              <a:t>17/03/2016</a:t>
+              <a:t>18/03/2016</a:t>
             </a:fld>
             <a:endParaRPr lang="fr-FR"/>
           </a:p>
@@ -1869,7 +2039,7 @@
           <a:p>
             <a:fld id="{A4504A64-8DDB-4D49-AD19-435B3080A0D9}" type="datetime1">
               <a:rPr lang="fr-FR" smtClean="0"/>
-              <a:t>17/03/2016</a:t>
+              <a:t>18/03/2016</a:t>
             </a:fld>
             <a:endParaRPr lang="fr-FR"/>
           </a:p>
@@ -2240,7 +2410,7 @@
           <a:p>
             <a:fld id="{495FCF92-D5A9-4E14-956F-1108A454119C}" type="datetime1">
               <a:rPr lang="fr-FR" smtClean="0"/>
-              <a:t>17/03/2016</a:t>
+              <a:t>18/03/2016</a:t>
             </a:fld>
             <a:endParaRPr lang="fr-FR"/>
           </a:p>
@@ -2362,7 +2532,7 @@
           <a:p>
             <a:fld id="{F9DAA3E3-201A-4383-A115-39C35F176B62}" type="datetime1">
               <a:rPr lang="fr-FR" smtClean="0"/>
-              <a:t>17/03/2016</a:t>
+              <a:t>18/03/2016</a:t>
             </a:fld>
             <a:endParaRPr lang="fr-FR"/>
           </a:p>
@@ -2461,7 +2631,7 @@
           <a:p>
             <a:fld id="{81E9144C-0678-4FAC-9A31-E77BD155BB48}" type="datetime1">
               <a:rPr lang="fr-FR" smtClean="0"/>
-              <a:t>17/03/2016</a:t>
+              <a:t>18/03/2016</a:t>
             </a:fld>
             <a:endParaRPr lang="fr-FR"/>
           </a:p>
@@ -2742,7 +2912,7 @@
           <a:p>
             <a:fld id="{D1C60314-110C-4363-AB81-AE9BF74480A6}" type="datetime1">
               <a:rPr lang="fr-FR" smtClean="0"/>
-              <a:t>17/03/2016</a:t>
+              <a:t>18/03/2016</a:t>
             </a:fld>
             <a:endParaRPr lang="fr-FR"/>
           </a:p>
@@ -2999,7 +3169,7 @@
           <a:p>
             <a:fld id="{9E8D6DD4-E69F-4808-A3FF-F98B040A8378}" type="datetime1">
               <a:rPr lang="fr-FR" smtClean="0"/>
-              <a:t>17/03/2016</a:t>
+              <a:t>18/03/2016</a:t>
             </a:fld>
             <a:endParaRPr lang="fr-FR"/>
           </a:p>
@@ -3216,7 +3386,7 @@
           <a:p>
             <a:fld id="{0874334A-139C-4B14-A1AE-36FFFDE7F932}" type="datetime1">
               <a:rPr lang="fr-FR" smtClean="0"/>
-              <a:t>17/03/2016</a:t>
+              <a:t>18/03/2016</a:t>
             </a:fld>
             <a:endParaRPr lang="fr-FR"/>
           </a:p>
@@ -3876,7 +4046,7 @@
                   <a:schemeClr val="bg1"/>
                 </a:solidFill>
               </a:rPr>
-              <a:t>17/03/2016</a:t>
+              <a:t>18/03/2016</a:t>
             </a:fld>
             <a:endParaRPr lang="fr-FR" dirty="0">
               <a:solidFill>
@@ -4162,13 +4332,13 @@
   <p:clrMapOvr>
     <a:masterClrMapping/>
   </p:clrMapOvr>
-  <mc:AlternateContent xmlns:mc="http://schemas.openxmlformats.org/markup-compatibility/2006">
-    <mc:Choice xmlns:p14="http://schemas.microsoft.com/office/powerpoint/2010/main" Requires="p14">
+  <mc:AlternateContent xmlns:mc="http://schemas.openxmlformats.org/markup-compatibility/2006" xmlns:p14="http://schemas.microsoft.com/office/powerpoint/2010/main">
+    <mc:Choice Requires="p14">
       <p:transition spd="slow" p14:dur="1500">
         <p14:reveal/>
       </p:transition>
     </mc:Choice>
-    <mc:Fallback>
+    <mc:Fallback xmlns="">
       <p:transition spd="slow">
         <p:fade/>
       </p:transition>
@@ -4477,7 +4647,7 @@
                   <a:schemeClr val="bg1"/>
                 </a:solidFill>
               </a:rPr>
-              <a:t>17/03/2016</a:t>
+              <a:t>18/03/2016</a:t>
             </a:fld>
             <a:endParaRPr lang="fr-FR" dirty="0">
               <a:solidFill>
@@ -4551,22 +4721,486 @@
           </a:p>
         </p:txBody>
       </p:sp>
+      <p:sp>
+        <p:nvSpPr>
+          <p:cNvPr id="5" name="Rectangle 4"/>
+          <p:cNvSpPr/>
+          <p:nvPr/>
+        </p:nvSpPr>
+        <p:spPr>
+          <a:xfrm>
+            <a:off x="3846031" y="368441"/>
+            <a:ext cx="4499951" cy="1200329"/>
+          </a:xfrm>
+          <a:prstGeom prst="rect">
+            <a:avLst/>
+          </a:prstGeom>
+          <a:noFill/>
+          <a:ln>
+            <a:noFill/>
+          </a:ln>
+          <a:effectLst>
+            <a:outerShdw blurRad="190500" dist="228600" dir="2700000" algn="ctr">
+              <a:srgbClr val="000000">
+                <a:alpha val="30000"/>
+              </a:srgbClr>
+            </a:outerShdw>
+          </a:effectLst>
+          <a:scene3d>
+            <a:camera prst="orthographicFront">
+              <a:rot lat="0" lon="0" rev="0"/>
+            </a:camera>
+            <a:lightRig rig="glow" dir="t">
+              <a:rot lat="0" lon="0" rev="4800000"/>
+            </a:lightRig>
+          </a:scene3d>
+          <a:sp3d prstMaterial="matte">
+            <a:bevelT w="127000" h="63500"/>
+          </a:sp3d>
+        </p:spPr>
+        <p:txBody>
+          <a:bodyPr wrap="none" lIns="91440" tIns="45720" rIns="91440" bIns="45720">
+            <a:spAutoFit/>
+          </a:bodyPr>
+          <a:lstStyle/>
+          <a:p>
+            <a:pPr algn="ctr"/>
+            <a:r>
+              <a:rPr lang="en-GB" sz="7200" b="1" cap="none" spc="0" dirty="0" smtClean="0">
+                <a:ln w="10160">
+                  <a:solidFill>
+                    <a:schemeClr val="accent1">
+                      <a:lumMod val="50000"/>
+                    </a:schemeClr>
+                  </a:solidFill>
+                  <a:prstDash val="solid"/>
+                </a:ln>
+                <a:solidFill>
+                  <a:srgbClr val="FFFFFF"/>
+                </a:solidFill>
+                <a:effectLst>
+                  <a:outerShdw blurRad="38100" dist="22860" dir="5400000" algn="tl" rotWithShape="0">
+                    <a:srgbClr val="000000">
+                      <a:alpha val="30000"/>
+                    </a:srgbClr>
+                  </a:outerShdw>
+                </a:effectLst>
+                <a:latin typeface="BadaBoom BB" panose="020B0603050302020204" pitchFamily="34" charset="0"/>
+              </a:rPr>
+              <a:t>Introduction</a:t>
+            </a:r>
+            <a:endParaRPr lang="en-GB" sz="7200" b="1" cap="none" spc="0" dirty="0">
+              <a:ln w="10160">
+                <a:solidFill>
+                  <a:schemeClr val="accent1">
+                    <a:lumMod val="50000"/>
+                  </a:schemeClr>
+                </a:solidFill>
+                <a:prstDash val="solid"/>
+              </a:ln>
+              <a:solidFill>
+                <a:srgbClr val="FFFFFF"/>
+              </a:solidFill>
+              <a:effectLst>
+                <a:outerShdw blurRad="38100" dist="22860" dir="5400000" algn="tl" rotWithShape="0">
+                  <a:srgbClr val="000000">
+                    <a:alpha val="30000"/>
+                  </a:srgbClr>
+                </a:outerShdw>
+              </a:effectLst>
+              <a:latin typeface="BadaBoom BB" panose="020B0603050302020204" pitchFamily="34" charset="0"/>
+            </a:endParaRPr>
+          </a:p>
+        </p:txBody>
+      </p:sp>
+      <p:sp>
+        <p:nvSpPr>
+          <p:cNvPr id="9" name="ZoneTexte 8"/>
+          <p:cNvSpPr txBox="1"/>
+          <p:nvPr/>
+        </p:nvSpPr>
+        <p:spPr>
+          <a:xfrm>
+            <a:off x="1210613" y="2266682"/>
+            <a:ext cx="11248521" cy="2246769"/>
+          </a:xfrm>
+          <a:prstGeom prst="rect">
+            <a:avLst/>
+          </a:prstGeom>
+          <a:noFill/>
+          <a:ln>
+            <a:noFill/>
+          </a:ln>
+          <a:effectLst>
+            <a:outerShdw blurRad="190500" dist="228600" dir="2700000" algn="ctr">
+              <a:srgbClr val="000000">
+                <a:alpha val="30000"/>
+              </a:srgbClr>
+            </a:outerShdw>
+          </a:effectLst>
+          <a:scene3d>
+            <a:camera prst="orthographicFront">
+              <a:rot lat="0" lon="0" rev="0"/>
+            </a:camera>
+            <a:lightRig rig="glow" dir="t">
+              <a:rot lat="0" lon="0" rev="4800000"/>
+            </a:lightRig>
+          </a:scene3d>
+          <a:sp3d prstMaterial="matte">
+            <a:bevelT w="127000" h="63500"/>
+          </a:sp3d>
+        </p:spPr>
+        <p:txBody>
+          <a:bodyPr wrap="square" rtlCol="0">
+            <a:spAutoFit/>
+          </a:bodyPr>
+          <a:lstStyle/>
+          <a:p>
+            <a:r>
+              <a:rPr lang="en-GB" sz="2800" b="1" dirty="0" smtClean="0">
+                <a:solidFill>
+                  <a:schemeClr val="bg1"/>
+                </a:solidFill>
+              </a:rPr>
+              <a:t>Goals : </a:t>
+            </a:r>
+          </a:p>
+          <a:p>
+            <a:endParaRPr lang="en-GB" sz="2800" dirty="0">
+              <a:solidFill>
+                <a:schemeClr val="bg1"/>
+              </a:solidFill>
+            </a:endParaRPr>
+          </a:p>
+          <a:p>
+            <a:pPr marL="1828800" lvl="3" indent="-457200">
+              <a:buFont typeface="Arial" panose="020B0604020202020204" pitchFamily="34" charset="0"/>
+              <a:buChar char="•"/>
+            </a:pPr>
+            <a:r>
+              <a:rPr lang="en-GB" sz="2800" dirty="0" smtClean="0">
+                <a:solidFill>
+                  <a:schemeClr val="bg1"/>
+                </a:solidFill>
+              </a:rPr>
+              <a:t>Helping people improving their English culture</a:t>
+            </a:r>
+          </a:p>
+          <a:p>
+            <a:pPr marL="1828800" lvl="3" indent="-457200">
+              <a:buFont typeface="Arial" panose="020B0604020202020204" pitchFamily="34" charset="0"/>
+              <a:buChar char="•"/>
+            </a:pPr>
+            <a:r>
+              <a:rPr lang="en-GB" sz="2800" dirty="0" smtClean="0">
+                <a:solidFill>
+                  <a:schemeClr val="bg1"/>
+                </a:solidFill>
+              </a:rPr>
+              <a:t>Create an application : “Learning without Learning”</a:t>
+            </a:r>
+          </a:p>
+          <a:p>
+            <a:pPr marL="1828800" lvl="3" indent="-457200">
+              <a:buFont typeface="Arial" panose="020B0604020202020204" pitchFamily="34" charset="0"/>
+              <a:buChar char="•"/>
+            </a:pPr>
+            <a:r>
+              <a:rPr lang="en-GB" sz="2800" dirty="0" smtClean="0">
+                <a:solidFill>
+                  <a:schemeClr val="bg1"/>
+                </a:solidFill>
+              </a:rPr>
+              <a:t>Enjoy the development </a:t>
+            </a:r>
+            <a:endParaRPr lang="en-GB" sz="2800" dirty="0" smtClean="0">
+              <a:solidFill>
+                <a:schemeClr val="bg1"/>
+              </a:solidFill>
+            </a:endParaRPr>
+          </a:p>
+        </p:txBody>
+      </p:sp>
     </p:spTree>
     <p:extLst>
       <p:ext uri="{BB962C8B-B14F-4D97-AF65-F5344CB8AC3E}">
-        <p14:creationId xmlns:p14="http://schemas.microsoft.com/office/powerpoint/2010/main" val="1942635360"/>
+        <p14:creationId xmlns:p14="http://schemas.microsoft.com/office/powerpoint/2010/main" val="498595921"/>
       </p:ext>
     </p:extLst>
   </p:cSld>
   <p:clrMapOvr>
     <a:masterClrMapping/>
   </p:clrMapOvr>
+  <mc:AlternateContent xmlns:mc="http://schemas.openxmlformats.org/markup-compatibility/2006">
+    <mc:Choice xmlns:p14="http://schemas.microsoft.com/office/powerpoint/2010/main" Requires="p14">
+      <p:transition spd="med" p14:dur="700">
+        <p:fade/>
+      </p:transition>
+    </mc:Choice>
+    <mc:Fallback>
+      <p:transition spd="med">
+        <p:fade/>
+      </p:transition>
+    </mc:Fallback>
+  </mc:AlternateContent>
   <p:timing>
     <p:tnLst>
       <p:par>
-        <p:cTn id="1" dur="indefinite" restart="never" nodeType="tmRoot"/>
+        <p:cTn id="1" dur="indefinite" restart="never" nodeType="tmRoot">
+          <p:childTnLst>
+            <p:seq concurrent="1" nextAc="seek">
+              <p:cTn id="2" dur="indefinite" nodeType="mainSeq">
+                <p:childTnLst>
+                  <p:par>
+                    <p:cTn id="3" fill="hold">
+                      <p:stCondLst>
+                        <p:cond delay="indefinite"/>
+                      </p:stCondLst>
+                      <p:childTnLst>
+                        <p:par>
+                          <p:cTn id="4" fill="hold">
+                            <p:stCondLst>
+                              <p:cond delay="0"/>
+                            </p:stCondLst>
+                            <p:childTnLst>
+                              <p:par>
+                                <p:cTn id="5" presetID="10" presetClass="entr" presetSubtype="0" fill="hold" grpId="0" nodeType="clickEffect">
+                                  <p:stCondLst>
+                                    <p:cond delay="0"/>
+                                  </p:stCondLst>
+                                  <p:childTnLst>
+                                    <p:set>
+                                      <p:cBhvr>
+                                        <p:cTn id="6" dur="1" fill="hold">
+                                          <p:stCondLst>
+                                            <p:cond delay="0"/>
+                                          </p:stCondLst>
+                                        </p:cTn>
+                                        <p:tgtEl>
+                                          <p:spTgt spid="9">
+                                            <p:txEl>
+                                              <p:pRg st="0" end="0"/>
+                                            </p:txEl>
+                                          </p:spTgt>
+                                        </p:tgtEl>
+                                        <p:attrNameLst>
+                                          <p:attrName>style.visibility</p:attrName>
+                                        </p:attrNameLst>
+                                      </p:cBhvr>
+                                      <p:to>
+                                        <p:strVal val="visible"/>
+                                      </p:to>
+                                    </p:set>
+                                    <p:animEffect transition="in" filter="fade">
+                                      <p:cBhvr>
+                                        <p:cTn id="7" dur="500"/>
+                                        <p:tgtEl>
+                                          <p:spTgt spid="9">
+                                            <p:txEl>
+                                              <p:pRg st="0" end="0"/>
+                                            </p:txEl>
+                                          </p:spTgt>
+                                        </p:tgtEl>
+                                      </p:cBhvr>
+                                    </p:animEffect>
+                                  </p:childTnLst>
+                                </p:cTn>
+                              </p:par>
+                              <p:par>
+                                <p:cTn id="8" presetID="10" presetClass="entr" presetSubtype="0" fill="hold" grpId="0" nodeType="withEffect">
+                                  <p:stCondLst>
+                                    <p:cond delay="0"/>
+                                  </p:stCondLst>
+                                  <p:childTnLst>
+                                    <p:set>
+                                      <p:cBhvr>
+                                        <p:cTn id="9" dur="1" fill="hold">
+                                          <p:stCondLst>
+                                            <p:cond delay="0"/>
+                                          </p:stCondLst>
+                                        </p:cTn>
+                                        <p:tgtEl>
+                                          <p:spTgt spid="9">
+                                            <p:txEl>
+                                              <p:pRg st="2" end="2"/>
+                                            </p:txEl>
+                                          </p:spTgt>
+                                        </p:tgtEl>
+                                        <p:attrNameLst>
+                                          <p:attrName>style.visibility</p:attrName>
+                                        </p:attrNameLst>
+                                      </p:cBhvr>
+                                      <p:to>
+                                        <p:strVal val="visible"/>
+                                      </p:to>
+                                    </p:set>
+                                    <p:animEffect transition="in" filter="fade">
+                                      <p:cBhvr>
+                                        <p:cTn id="10" dur="500"/>
+                                        <p:tgtEl>
+                                          <p:spTgt spid="9">
+                                            <p:txEl>
+                                              <p:pRg st="2" end="2"/>
+                                            </p:txEl>
+                                          </p:spTgt>
+                                        </p:tgtEl>
+                                      </p:cBhvr>
+                                    </p:animEffect>
+                                  </p:childTnLst>
+                                </p:cTn>
+                              </p:par>
+                            </p:childTnLst>
+                          </p:cTn>
+                        </p:par>
+                      </p:childTnLst>
+                    </p:cTn>
+                  </p:par>
+                  <p:par>
+                    <p:cTn id="11" fill="hold">
+                      <p:stCondLst>
+                        <p:cond delay="indefinite"/>
+                      </p:stCondLst>
+                      <p:childTnLst>
+                        <p:par>
+                          <p:cTn id="12" fill="hold">
+                            <p:stCondLst>
+                              <p:cond delay="0"/>
+                            </p:stCondLst>
+                            <p:childTnLst>
+                              <p:par>
+                                <p:cTn id="13" presetID="10" presetClass="entr" presetSubtype="0" fill="hold" grpId="0" nodeType="clickEffect">
+                                  <p:stCondLst>
+                                    <p:cond delay="0"/>
+                                  </p:stCondLst>
+                                  <p:childTnLst>
+                                    <p:set>
+                                      <p:cBhvr>
+                                        <p:cTn id="14" dur="1" fill="hold">
+                                          <p:stCondLst>
+                                            <p:cond delay="0"/>
+                                          </p:stCondLst>
+                                        </p:cTn>
+                                        <p:tgtEl>
+                                          <p:spTgt spid="9">
+                                            <p:txEl>
+                                              <p:pRg st="3" end="3"/>
+                                            </p:txEl>
+                                          </p:spTgt>
+                                        </p:tgtEl>
+                                        <p:attrNameLst>
+                                          <p:attrName>style.visibility</p:attrName>
+                                        </p:attrNameLst>
+                                      </p:cBhvr>
+                                      <p:to>
+                                        <p:strVal val="visible"/>
+                                      </p:to>
+                                    </p:set>
+                                    <p:animEffect transition="in" filter="fade">
+                                      <p:cBhvr>
+                                        <p:cTn id="15" dur="500"/>
+                                        <p:tgtEl>
+                                          <p:spTgt spid="9">
+                                            <p:txEl>
+                                              <p:pRg st="3" end="3"/>
+                                            </p:txEl>
+                                          </p:spTgt>
+                                        </p:tgtEl>
+                                      </p:cBhvr>
+                                    </p:animEffect>
+                                  </p:childTnLst>
+                                </p:cTn>
+                              </p:par>
+                            </p:childTnLst>
+                          </p:cTn>
+                        </p:par>
+                      </p:childTnLst>
+                    </p:cTn>
+                  </p:par>
+                  <p:par>
+                    <p:cTn id="16" fill="hold">
+                      <p:stCondLst>
+                        <p:cond delay="indefinite"/>
+                      </p:stCondLst>
+                      <p:childTnLst>
+                        <p:par>
+                          <p:cTn id="17" fill="hold">
+                            <p:stCondLst>
+                              <p:cond delay="0"/>
+                            </p:stCondLst>
+                            <p:childTnLst>
+                              <p:par>
+                                <p:cTn id="18" presetID="10" presetClass="entr" presetSubtype="0" fill="hold" grpId="0" nodeType="clickEffect">
+                                  <p:stCondLst>
+                                    <p:cond delay="0"/>
+                                  </p:stCondLst>
+                                  <p:childTnLst>
+                                    <p:set>
+                                      <p:cBhvr>
+                                        <p:cTn id="19" dur="1" fill="hold">
+                                          <p:stCondLst>
+                                            <p:cond delay="0"/>
+                                          </p:stCondLst>
+                                        </p:cTn>
+                                        <p:tgtEl>
+                                          <p:spTgt spid="9">
+                                            <p:txEl>
+                                              <p:pRg st="4" end="4"/>
+                                            </p:txEl>
+                                          </p:spTgt>
+                                        </p:tgtEl>
+                                        <p:attrNameLst>
+                                          <p:attrName>style.visibility</p:attrName>
+                                        </p:attrNameLst>
+                                      </p:cBhvr>
+                                      <p:to>
+                                        <p:strVal val="visible"/>
+                                      </p:to>
+                                    </p:set>
+                                    <p:animEffect transition="in" filter="fade">
+                                      <p:cBhvr>
+                                        <p:cTn id="20" dur="500"/>
+                                        <p:tgtEl>
+                                          <p:spTgt spid="9">
+                                            <p:txEl>
+                                              <p:pRg st="4" end="4"/>
+                                            </p:txEl>
+                                          </p:spTgt>
+                                        </p:tgtEl>
+                                      </p:cBhvr>
+                                    </p:animEffect>
+                                  </p:childTnLst>
+                                </p:cTn>
+                              </p:par>
+                            </p:childTnLst>
+                          </p:cTn>
+                        </p:par>
+                      </p:childTnLst>
+                    </p:cTn>
+                  </p:par>
+                </p:childTnLst>
+              </p:cTn>
+              <p:prevCondLst>
+                <p:cond evt="onPrev" delay="0">
+                  <p:tgtEl>
+                    <p:sldTgt/>
+                  </p:tgtEl>
+                </p:cond>
+              </p:prevCondLst>
+              <p:nextCondLst>
+                <p:cond evt="onNext" delay="0">
+                  <p:tgtEl>
+                    <p:sldTgt/>
+                  </p:tgtEl>
+                </p:cond>
+              </p:nextCondLst>
+            </p:seq>
+          </p:childTnLst>
+        </p:cTn>
       </p:par>
     </p:tnLst>
+    <p:bldLst>
+      <p:bldP spid="9" grpId="0" uiExpand="1" build="p" bldLvl="2"/>
+    </p:bldLst>
   </p:timing>
 </p:sld>
 </file>
@@ -4623,7 +5257,7 @@
                   <a:schemeClr val="bg1"/>
                 </a:solidFill>
               </a:rPr>
-              <a:t>17/03/2016</a:t>
+              <a:t>18/03/2016</a:t>
             </a:fld>
             <a:endParaRPr lang="fr-FR" dirty="0">
               <a:solidFill>
@@ -4688,6 +5322,779 @@
                 </a:solidFill>
               </a:rPr>
               <a:t>4</a:t>
+            </a:fld>
+            <a:endParaRPr lang="fr-FR" dirty="0">
+              <a:solidFill>
+                <a:schemeClr val="bg1"/>
+              </a:solidFill>
+            </a:endParaRPr>
+          </a:p>
+        </p:txBody>
+      </p:sp>
+      <p:sp>
+        <p:nvSpPr>
+          <p:cNvPr id="5" name="Rectangle 4"/>
+          <p:cNvSpPr/>
+          <p:nvPr/>
+        </p:nvSpPr>
+        <p:spPr>
+          <a:xfrm>
+            <a:off x="3861259" y="368441"/>
+            <a:ext cx="4469493" cy="1200329"/>
+          </a:xfrm>
+          <a:prstGeom prst="rect">
+            <a:avLst/>
+          </a:prstGeom>
+          <a:noFill/>
+          <a:ln>
+            <a:noFill/>
+          </a:ln>
+          <a:effectLst>
+            <a:outerShdw blurRad="190500" dist="228600" dir="2700000" algn="ctr">
+              <a:srgbClr val="000000">
+                <a:alpha val="30000"/>
+              </a:srgbClr>
+            </a:outerShdw>
+          </a:effectLst>
+          <a:scene3d>
+            <a:camera prst="orthographicFront">
+              <a:rot lat="0" lon="0" rev="0"/>
+            </a:camera>
+            <a:lightRig rig="glow" dir="t">
+              <a:rot lat="0" lon="0" rev="4800000"/>
+            </a:lightRig>
+          </a:scene3d>
+          <a:sp3d prstMaterial="matte">
+            <a:bevelT w="127000" h="63500"/>
+          </a:sp3d>
+        </p:spPr>
+        <p:txBody>
+          <a:bodyPr wrap="none" lIns="91440" tIns="45720" rIns="91440" bIns="45720">
+            <a:spAutoFit/>
+          </a:bodyPr>
+          <a:lstStyle/>
+          <a:p>
+            <a:pPr algn="ctr"/>
+            <a:r>
+              <a:rPr lang="en-GB" sz="7200" b="1" cap="none" spc="0" dirty="0" smtClean="0">
+                <a:ln w="10160">
+                  <a:solidFill>
+                    <a:schemeClr val="accent1">
+                      <a:lumMod val="50000"/>
+                    </a:schemeClr>
+                  </a:solidFill>
+                  <a:prstDash val="solid"/>
+                </a:ln>
+                <a:solidFill>
+                  <a:srgbClr val="FFFFFF"/>
+                </a:solidFill>
+                <a:effectLst>
+                  <a:outerShdw blurRad="38100" dist="22860" dir="5400000" algn="tl" rotWithShape="0">
+                    <a:srgbClr val="000000">
+                      <a:alpha val="30000"/>
+                    </a:srgbClr>
+                  </a:outerShdw>
+                </a:effectLst>
+                <a:latin typeface="BadaBoom BB" panose="020B0603050302020204" pitchFamily="34" charset="0"/>
+              </a:rPr>
+              <a:t>The main idea</a:t>
+            </a:r>
+            <a:endParaRPr lang="en-GB" sz="7200" b="1" cap="none" spc="0" dirty="0">
+              <a:ln w="10160">
+                <a:solidFill>
+                  <a:schemeClr val="accent1">
+                    <a:lumMod val="50000"/>
+                  </a:schemeClr>
+                </a:solidFill>
+                <a:prstDash val="solid"/>
+              </a:ln>
+              <a:solidFill>
+                <a:srgbClr val="FFFFFF"/>
+              </a:solidFill>
+              <a:effectLst>
+                <a:outerShdw blurRad="38100" dist="22860" dir="5400000" algn="tl" rotWithShape="0">
+                  <a:srgbClr val="000000">
+                    <a:alpha val="30000"/>
+                  </a:srgbClr>
+                </a:outerShdw>
+              </a:effectLst>
+              <a:latin typeface="BadaBoom BB" panose="020B0603050302020204" pitchFamily="34" charset="0"/>
+            </a:endParaRPr>
+          </a:p>
+        </p:txBody>
+      </p:sp>
+      <p:sp>
+        <p:nvSpPr>
+          <p:cNvPr id="9" name="ZoneTexte 8"/>
+          <p:cNvSpPr txBox="1"/>
+          <p:nvPr/>
+        </p:nvSpPr>
+        <p:spPr>
+          <a:xfrm>
+            <a:off x="2311524" y="2427394"/>
+            <a:ext cx="4448065" cy="523220"/>
+          </a:xfrm>
+          <a:prstGeom prst="rect">
+            <a:avLst/>
+          </a:prstGeom>
+          <a:noFill/>
+          <a:ln>
+            <a:noFill/>
+          </a:ln>
+          <a:effectLst>
+            <a:outerShdw blurRad="190500" dist="228600" dir="2700000" algn="ctr">
+              <a:srgbClr val="000000">
+                <a:alpha val="30000"/>
+              </a:srgbClr>
+            </a:outerShdw>
+          </a:effectLst>
+          <a:scene3d>
+            <a:camera prst="orthographicFront">
+              <a:rot lat="0" lon="0" rev="0"/>
+            </a:camera>
+            <a:lightRig rig="glow" dir="t">
+              <a:rot lat="0" lon="0" rev="4800000"/>
+            </a:lightRig>
+          </a:scene3d>
+          <a:sp3d prstMaterial="matte">
+            <a:bevelT w="127000" h="63500"/>
+          </a:sp3d>
+        </p:spPr>
+        <p:txBody>
+          <a:bodyPr wrap="square" rtlCol="0">
+            <a:spAutoFit/>
+          </a:bodyPr>
+          <a:lstStyle/>
+          <a:p>
+            <a:pPr marL="457200" indent="-457200">
+              <a:buFont typeface="Arial" panose="020B0604020202020204" pitchFamily="34" charset="0"/>
+              <a:buChar char="•"/>
+            </a:pPr>
+            <a:r>
+              <a:rPr lang="en-GB" sz="2800" dirty="0" smtClean="0">
+                <a:solidFill>
+                  <a:schemeClr val="bg1"/>
+                </a:solidFill>
+              </a:rPr>
+              <a:t>Take the concept</a:t>
+            </a:r>
+          </a:p>
+        </p:txBody>
+      </p:sp>
+      <p:pic>
+        <p:nvPicPr>
+          <p:cNvPr id="1028" name="Picture 4" descr="Afficher l'image d'origine"/>
+          <p:cNvPicPr>
+            <a:picLocks noChangeAspect="1" noChangeArrowheads="1"/>
+          </p:cNvPicPr>
+          <p:nvPr/>
+        </p:nvPicPr>
+        <p:blipFill>
+          <a:blip r:embed="rId4">
+            <a:extLst>
+              <a:ext uri="{28A0092B-C50C-407E-A947-70E740481C1C}">
+                <a14:useLocalDpi xmlns:a14="http://schemas.microsoft.com/office/drawing/2010/main" val="0"/>
+              </a:ext>
+            </a:extLst>
+          </a:blip>
+          <a:srcRect/>
+          <a:stretch>
+            <a:fillRect/>
+          </a:stretch>
+        </p:blipFill>
+        <p:spPr bwMode="auto">
+          <a:xfrm>
+            <a:off x="8839200" y="2640937"/>
+            <a:ext cx="2239618" cy="2239618"/>
+          </a:xfrm>
+          <a:prstGeom prst="rect">
+            <a:avLst/>
+          </a:prstGeom>
+          <a:ln>
+            <a:noFill/>
+          </a:ln>
+          <a:effectLst>
+            <a:outerShdw blurRad="292100" dist="139700" dir="2700000" algn="tl" rotWithShape="0">
+              <a:srgbClr val="333333">
+                <a:alpha val="65000"/>
+              </a:srgbClr>
+            </a:outerShdw>
+          </a:effectLst>
+          <a:extLst>
+            <a:ext uri="{909E8E84-426E-40DD-AFC4-6F175D3DCCD1}">
+              <a14:hiddenFill xmlns:a14="http://schemas.microsoft.com/office/drawing/2010/main">
+                <a:solidFill>
+                  <a:srgbClr val="FFFFFF"/>
+                </a:solidFill>
+              </a14:hiddenFill>
+            </a:ext>
+          </a:extLst>
+        </p:spPr>
+      </p:pic>
+      <p:sp>
+        <p:nvSpPr>
+          <p:cNvPr id="13" name="ZoneTexte 12"/>
+          <p:cNvSpPr txBox="1"/>
+          <p:nvPr/>
+        </p:nvSpPr>
+        <p:spPr>
+          <a:xfrm>
+            <a:off x="2583193" y="3124722"/>
+            <a:ext cx="6256007" cy="1815882"/>
+          </a:xfrm>
+          <a:prstGeom prst="rect">
+            <a:avLst/>
+          </a:prstGeom>
+          <a:noFill/>
+          <a:ln>
+            <a:noFill/>
+          </a:ln>
+          <a:effectLst>
+            <a:outerShdw blurRad="190500" dist="228600" dir="2700000" algn="ctr">
+              <a:srgbClr val="000000">
+                <a:alpha val="30000"/>
+              </a:srgbClr>
+            </a:outerShdw>
+          </a:effectLst>
+          <a:scene3d>
+            <a:camera prst="orthographicFront">
+              <a:rot lat="0" lon="0" rev="0"/>
+            </a:camera>
+            <a:lightRig rig="glow" dir="t">
+              <a:rot lat="0" lon="0" rev="4800000"/>
+            </a:lightRig>
+          </a:scene3d>
+          <a:sp3d prstMaterial="matte">
+            <a:bevelT w="127000" h="63500"/>
+          </a:sp3d>
+        </p:spPr>
+        <p:txBody>
+          <a:bodyPr wrap="square" rtlCol="0">
+            <a:spAutoFit/>
+          </a:bodyPr>
+          <a:lstStyle/>
+          <a:p>
+            <a:pPr marL="457200" indent="-457200">
+              <a:buFont typeface="Arial" panose="020B0604020202020204" pitchFamily="34" charset="0"/>
+              <a:buChar char="•"/>
+            </a:pPr>
+            <a:r>
+              <a:rPr lang="en-GB" sz="2800" dirty="0" smtClean="0">
+                <a:solidFill>
+                  <a:schemeClr val="bg1"/>
+                </a:solidFill>
+              </a:rPr>
+              <a:t>Adapt it with our rules :</a:t>
+            </a:r>
+          </a:p>
+          <a:p>
+            <a:pPr marL="457200" indent="-457200">
+              <a:buFont typeface="Arial" panose="020B0604020202020204" pitchFamily="34" charset="0"/>
+              <a:buChar char="•"/>
+            </a:pPr>
+            <a:endParaRPr lang="en-GB" sz="2800" dirty="0">
+              <a:solidFill>
+                <a:schemeClr val="bg1"/>
+              </a:solidFill>
+            </a:endParaRPr>
+          </a:p>
+          <a:p>
+            <a:r>
+              <a:rPr lang="en-GB" sz="2800" i="1" dirty="0" smtClean="0">
+                <a:solidFill>
+                  <a:schemeClr val="bg1"/>
+                </a:solidFill>
+              </a:rPr>
+              <a:t>      Specific topic for questions</a:t>
+            </a:r>
+          </a:p>
+          <a:p>
+            <a:r>
+              <a:rPr lang="en-GB" sz="2800" i="1" dirty="0" smtClean="0">
+                <a:solidFill>
+                  <a:schemeClr val="bg1"/>
+                </a:solidFill>
+              </a:rPr>
+              <a:t>      50 : 50 is the only bonus available</a:t>
+            </a:r>
+          </a:p>
+        </p:txBody>
+      </p:sp>
+    </p:spTree>
+    <p:extLst>
+      <p:ext uri="{BB962C8B-B14F-4D97-AF65-F5344CB8AC3E}">
+        <p14:creationId xmlns:p14="http://schemas.microsoft.com/office/powerpoint/2010/main" val="1942635360"/>
+      </p:ext>
+    </p:extLst>
+  </p:cSld>
+  <p:clrMapOvr>
+    <a:masterClrMapping/>
+  </p:clrMapOvr>
+  <mc:AlternateContent xmlns:mc="http://schemas.openxmlformats.org/markup-compatibility/2006">
+    <mc:Choice xmlns:p14="http://schemas.microsoft.com/office/powerpoint/2010/main" Requires="p14">
+      <p:transition spd="med" p14:dur="700">
+        <p:fade/>
+      </p:transition>
+    </mc:Choice>
+    <mc:Fallback>
+      <p:transition spd="med">
+        <p:fade/>
+      </p:transition>
+    </mc:Fallback>
+  </mc:AlternateContent>
+  <p:timing>
+    <p:tnLst>
+      <p:par>
+        <p:cTn id="1" dur="indefinite" restart="never" nodeType="tmRoot">
+          <p:childTnLst>
+            <p:seq concurrent="1" nextAc="seek">
+              <p:cTn id="2" dur="indefinite" nodeType="mainSeq">
+                <p:childTnLst>
+                  <p:par>
+                    <p:cTn id="3" fill="hold">
+                      <p:stCondLst>
+                        <p:cond delay="indefinite"/>
+                      </p:stCondLst>
+                      <p:childTnLst>
+                        <p:par>
+                          <p:cTn id="4" fill="hold">
+                            <p:stCondLst>
+                              <p:cond delay="0"/>
+                            </p:stCondLst>
+                            <p:childTnLst>
+                              <p:par>
+                                <p:cTn id="5" presetID="10" presetClass="entr" presetSubtype="0" fill="hold" nodeType="clickEffect">
+                                  <p:stCondLst>
+                                    <p:cond delay="0"/>
+                                  </p:stCondLst>
+                                  <p:childTnLst>
+                                    <p:set>
+                                      <p:cBhvr>
+                                        <p:cTn id="6" dur="1" fill="hold">
+                                          <p:stCondLst>
+                                            <p:cond delay="0"/>
+                                          </p:stCondLst>
+                                        </p:cTn>
+                                        <p:tgtEl>
+                                          <p:spTgt spid="1028"/>
+                                        </p:tgtEl>
+                                        <p:attrNameLst>
+                                          <p:attrName>style.visibility</p:attrName>
+                                        </p:attrNameLst>
+                                      </p:cBhvr>
+                                      <p:to>
+                                        <p:strVal val="visible"/>
+                                      </p:to>
+                                    </p:set>
+                                    <p:animEffect transition="in" filter="fade">
+                                      <p:cBhvr>
+                                        <p:cTn id="7" dur="500"/>
+                                        <p:tgtEl>
+                                          <p:spTgt spid="1028"/>
+                                        </p:tgtEl>
+                                      </p:cBhvr>
+                                    </p:animEffect>
+                                  </p:childTnLst>
+                                </p:cTn>
+                              </p:par>
+                            </p:childTnLst>
+                          </p:cTn>
+                        </p:par>
+                      </p:childTnLst>
+                    </p:cTn>
+                  </p:par>
+                </p:childTnLst>
+              </p:cTn>
+              <p:prevCondLst>
+                <p:cond evt="onPrev" delay="0">
+                  <p:tgtEl>
+                    <p:sldTgt/>
+                  </p:tgtEl>
+                </p:cond>
+              </p:prevCondLst>
+              <p:nextCondLst>
+                <p:cond evt="onNext" delay="0">
+                  <p:tgtEl>
+                    <p:sldTgt/>
+                  </p:tgtEl>
+                </p:cond>
+              </p:nextCondLst>
+            </p:seq>
+          </p:childTnLst>
+        </p:cTn>
+      </p:par>
+    </p:tnLst>
+  </p:timing>
+</p:sld>
+</file>
+
+<file path=ppt/slides/slide5.xml><?xml version="1.0" encoding="utf-8"?>
+<p:sld xmlns:a="http://schemas.openxmlformats.org/drawingml/2006/main" xmlns:r="http://schemas.openxmlformats.org/officeDocument/2006/relationships" xmlns:p="http://schemas.openxmlformats.org/presentationml/2006/main">
+  <p:cSld>
+    <p:bg>
+      <p:bgPr>
+        <a:blipFill dpi="0" rotWithShape="1">
+          <a:blip r:embed="rId3">
+            <a:lum/>
+          </a:blip>
+          <a:srcRect/>
+          <a:stretch>
+            <a:fillRect l="-10000" r="-10000"/>
+          </a:stretch>
+        </a:blipFill>
+        <a:effectLst/>
+      </p:bgPr>
+    </p:bg>
+    <p:spTree>
+      <p:nvGrpSpPr>
+        <p:cNvPr id="1" name=""/>
+        <p:cNvGrpSpPr/>
+        <p:nvPr/>
+      </p:nvGrpSpPr>
+      <p:grpSpPr>
+        <a:xfrm>
+          <a:off x="0" y="0"/>
+          <a:ext cx="0" cy="0"/>
+          <a:chOff x="0" y="0"/>
+          <a:chExt cx="0" cy="0"/>
+        </a:xfrm>
+      </p:grpSpPr>
+      <p:sp>
+        <p:nvSpPr>
+          <p:cNvPr id="6" name="Espace réservé de la date 5"/>
+          <p:cNvSpPr>
+            <a:spLocks noGrp="1"/>
+          </p:cNvSpPr>
+          <p:nvPr>
+            <p:ph type="dt" sz="half" idx="10"/>
+          </p:nvPr>
+        </p:nvSpPr>
+        <p:spPr/>
+        <p:txBody>
+          <a:bodyPr/>
+          <a:lstStyle/>
+          <a:p>
+            <a:fld id="{1D42B496-28C6-43F1-AA5E-DCEC283D924C}" type="datetime1">
+              <a:rPr lang="fr-FR" smtClean="0">
+                <a:solidFill>
+                  <a:schemeClr val="bg1"/>
+                </a:solidFill>
+              </a:rPr>
+              <a:t>18/03/2016</a:t>
+            </a:fld>
+            <a:endParaRPr lang="fr-FR" dirty="0">
+              <a:solidFill>
+                <a:schemeClr val="bg1"/>
+              </a:solidFill>
+            </a:endParaRPr>
+          </a:p>
+        </p:txBody>
+      </p:sp>
+      <p:sp>
+        <p:nvSpPr>
+          <p:cNvPr id="7" name="Espace réservé du pied de page 6"/>
+          <p:cNvSpPr>
+            <a:spLocks noGrp="1"/>
+          </p:cNvSpPr>
+          <p:nvPr>
+            <p:ph type="ftr" sz="quarter" idx="11"/>
+          </p:nvPr>
+        </p:nvSpPr>
+        <p:spPr/>
+        <p:txBody>
+          <a:bodyPr/>
+          <a:lstStyle/>
+          <a:p>
+            <a:r>
+              <a:rPr lang="fr-FR" sz="2400" dirty="0" smtClean="0">
+                <a:solidFill>
+                  <a:schemeClr val="bg1"/>
+                </a:solidFill>
+                <a:latin typeface="BadaBoom BB" panose="020B0603050302020204" pitchFamily="34" charset="0"/>
+              </a:rPr>
+              <a:t>Big Ben</a:t>
+            </a:r>
+            <a:endParaRPr lang="fr-FR" sz="2400" dirty="0">
+              <a:solidFill>
+                <a:schemeClr val="bg1"/>
+              </a:solidFill>
+              <a:latin typeface="BadaBoom BB" panose="020B0603050302020204" pitchFamily="34" charset="0"/>
+            </a:endParaRPr>
+          </a:p>
+        </p:txBody>
+      </p:sp>
+      <p:sp>
+        <p:nvSpPr>
+          <p:cNvPr id="8" name="Espace réservé du numéro de diapositive 7"/>
+          <p:cNvSpPr>
+            <a:spLocks noGrp="1"/>
+          </p:cNvSpPr>
+          <p:nvPr>
+            <p:ph type="sldNum" sz="quarter" idx="12"/>
+          </p:nvPr>
+        </p:nvSpPr>
+        <p:spPr/>
+        <p:txBody>
+          <a:bodyPr/>
+          <a:lstStyle/>
+          <a:p>
+            <a:fld id="{D347F7E7-DA46-45CC-ACCA-4679FD1F5CF6}" type="slidenum">
+              <a:rPr lang="fr-FR" smtClean="0">
+                <a:solidFill>
+                  <a:schemeClr val="bg1"/>
+                </a:solidFill>
+              </a:rPr>
+              <a:t>5</a:t>
+            </a:fld>
+            <a:endParaRPr lang="fr-FR" dirty="0">
+              <a:solidFill>
+                <a:schemeClr val="bg1"/>
+              </a:solidFill>
+            </a:endParaRPr>
+          </a:p>
+        </p:txBody>
+      </p:sp>
+      <p:sp>
+        <p:nvSpPr>
+          <p:cNvPr id="5" name="Rectangle 4"/>
+          <p:cNvSpPr/>
+          <p:nvPr/>
+        </p:nvSpPr>
+        <p:spPr>
+          <a:xfrm>
+            <a:off x="3857254" y="368441"/>
+            <a:ext cx="4477508" cy="1200329"/>
+          </a:xfrm>
+          <a:prstGeom prst="rect">
+            <a:avLst/>
+          </a:prstGeom>
+          <a:noFill/>
+          <a:ln>
+            <a:noFill/>
+          </a:ln>
+          <a:effectLst>
+            <a:outerShdw blurRad="190500" dist="228600" dir="2700000" algn="ctr">
+              <a:srgbClr val="000000">
+                <a:alpha val="30000"/>
+              </a:srgbClr>
+            </a:outerShdw>
+          </a:effectLst>
+          <a:scene3d>
+            <a:camera prst="orthographicFront">
+              <a:rot lat="0" lon="0" rev="0"/>
+            </a:camera>
+            <a:lightRig rig="glow" dir="t">
+              <a:rot lat="0" lon="0" rev="4800000"/>
+            </a:lightRig>
+          </a:scene3d>
+          <a:sp3d prstMaterial="matte">
+            <a:bevelT w="127000" h="63500"/>
+          </a:sp3d>
+        </p:spPr>
+        <p:txBody>
+          <a:bodyPr wrap="none" lIns="91440" tIns="45720" rIns="91440" bIns="45720">
+            <a:spAutoFit/>
+          </a:bodyPr>
+          <a:lstStyle/>
+          <a:p>
+            <a:pPr algn="ctr"/>
+            <a:r>
+              <a:rPr lang="en-GB" sz="7200" b="1" cap="none" spc="0" dirty="0" smtClean="0">
+                <a:ln w="10160">
+                  <a:solidFill>
+                    <a:schemeClr val="accent1">
+                      <a:lumMod val="50000"/>
+                    </a:schemeClr>
+                  </a:solidFill>
+                  <a:prstDash val="solid"/>
+                </a:ln>
+                <a:solidFill>
+                  <a:srgbClr val="FFFFFF"/>
+                </a:solidFill>
+                <a:effectLst>
+                  <a:outerShdw blurRad="38100" dist="22860" dir="5400000" algn="tl" rotWithShape="0">
+                    <a:srgbClr val="000000">
+                      <a:alpha val="30000"/>
+                    </a:srgbClr>
+                  </a:outerShdw>
+                </a:effectLst>
+                <a:latin typeface="BadaBoom BB" panose="020B0603050302020204" pitchFamily="34" charset="0"/>
+              </a:rPr>
+              <a:t>Presentation</a:t>
+            </a:r>
+            <a:endParaRPr lang="en-GB" sz="7200" b="1" cap="none" spc="0" dirty="0">
+              <a:ln w="10160">
+                <a:solidFill>
+                  <a:schemeClr val="accent1">
+                    <a:lumMod val="50000"/>
+                  </a:schemeClr>
+                </a:solidFill>
+                <a:prstDash val="solid"/>
+              </a:ln>
+              <a:solidFill>
+                <a:srgbClr val="FFFFFF"/>
+              </a:solidFill>
+              <a:effectLst>
+                <a:outerShdw blurRad="38100" dist="22860" dir="5400000" algn="tl" rotWithShape="0">
+                  <a:srgbClr val="000000">
+                    <a:alpha val="30000"/>
+                  </a:srgbClr>
+                </a:outerShdw>
+              </a:effectLst>
+              <a:latin typeface="BadaBoom BB" panose="020B0603050302020204" pitchFamily="34" charset="0"/>
+            </a:endParaRPr>
+          </a:p>
+        </p:txBody>
+      </p:sp>
+    </p:spTree>
+    <p:extLst>
+      <p:ext uri="{BB962C8B-B14F-4D97-AF65-F5344CB8AC3E}">
+        <p14:creationId xmlns:p14="http://schemas.microsoft.com/office/powerpoint/2010/main" val="109235217"/>
+      </p:ext>
+    </p:extLst>
+  </p:cSld>
+  <p:clrMapOvr>
+    <a:masterClrMapping/>
+  </p:clrMapOvr>
+  <mc:AlternateContent xmlns:mc="http://schemas.openxmlformats.org/markup-compatibility/2006">
+    <mc:Choice xmlns:p14="http://schemas.microsoft.com/office/powerpoint/2010/main" Requires="p14">
+      <p:transition spd="med" p14:dur="700">
+        <p:fade/>
+      </p:transition>
+    </mc:Choice>
+    <mc:Fallback>
+      <p:transition spd="med">
+        <p:fade/>
+      </p:transition>
+    </mc:Fallback>
+  </mc:AlternateContent>
+  <p:timing>
+    <p:tnLst>
+      <p:par>
+        <p:cTn id="1" dur="indefinite" restart="never" nodeType="tmRoot"/>
+      </p:par>
+    </p:tnLst>
+  </p:timing>
+</p:sld>
+</file>
+
+<file path=ppt/slides/slide6.xml><?xml version="1.0" encoding="utf-8"?>
+<p:sld xmlns:a="http://schemas.openxmlformats.org/drawingml/2006/main" xmlns:r="http://schemas.openxmlformats.org/officeDocument/2006/relationships" xmlns:p="http://schemas.openxmlformats.org/presentationml/2006/main">
+  <p:cSld>
+    <p:bg>
+      <p:bgPr>
+        <a:blipFill dpi="0" rotWithShape="1">
+          <a:blip r:embed="rId3">
+            <a:lum/>
+          </a:blip>
+          <a:srcRect/>
+          <a:stretch>
+            <a:fillRect l="-10000" r="-10000"/>
+          </a:stretch>
+        </a:blipFill>
+        <a:effectLst/>
+      </p:bgPr>
+    </p:bg>
+    <p:spTree>
+      <p:nvGrpSpPr>
+        <p:cNvPr id="1" name=""/>
+        <p:cNvGrpSpPr/>
+        <p:nvPr/>
+      </p:nvGrpSpPr>
+      <p:grpSpPr>
+        <a:xfrm>
+          <a:off x="0" y="0"/>
+          <a:ext cx="0" cy="0"/>
+          <a:chOff x="0" y="0"/>
+          <a:chExt cx="0" cy="0"/>
+        </a:xfrm>
+      </p:grpSpPr>
+      <p:sp>
+        <p:nvSpPr>
+          <p:cNvPr id="6" name="Espace réservé de la date 5"/>
+          <p:cNvSpPr>
+            <a:spLocks noGrp="1"/>
+          </p:cNvSpPr>
+          <p:nvPr>
+            <p:ph type="dt" sz="half" idx="10"/>
+          </p:nvPr>
+        </p:nvSpPr>
+        <p:spPr/>
+        <p:txBody>
+          <a:bodyPr/>
+          <a:lstStyle/>
+          <a:p>
+            <a:fld id="{1D42B496-28C6-43F1-AA5E-DCEC283D924C}" type="datetime1">
+              <a:rPr lang="fr-FR" smtClean="0">
+                <a:solidFill>
+                  <a:schemeClr val="bg1"/>
+                </a:solidFill>
+              </a:rPr>
+              <a:t>18/03/2016</a:t>
+            </a:fld>
+            <a:endParaRPr lang="fr-FR" dirty="0">
+              <a:solidFill>
+                <a:schemeClr val="bg1"/>
+              </a:solidFill>
+            </a:endParaRPr>
+          </a:p>
+        </p:txBody>
+      </p:sp>
+      <p:sp>
+        <p:nvSpPr>
+          <p:cNvPr id="7" name="Espace réservé du pied de page 6"/>
+          <p:cNvSpPr>
+            <a:spLocks noGrp="1"/>
+          </p:cNvSpPr>
+          <p:nvPr>
+            <p:ph type="ftr" sz="quarter" idx="11"/>
+          </p:nvPr>
+        </p:nvSpPr>
+        <p:spPr/>
+        <p:txBody>
+          <a:bodyPr/>
+          <a:lstStyle/>
+          <a:p>
+            <a:r>
+              <a:rPr lang="fr-FR" sz="2400" dirty="0" smtClean="0">
+                <a:solidFill>
+                  <a:schemeClr val="bg1"/>
+                </a:solidFill>
+                <a:latin typeface="BadaBoom BB" panose="020B0603050302020204" pitchFamily="34" charset="0"/>
+              </a:rPr>
+              <a:t>Big Ben</a:t>
+            </a:r>
+            <a:endParaRPr lang="fr-FR" sz="2400" dirty="0">
+              <a:solidFill>
+                <a:schemeClr val="bg1"/>
+              </a:solidFill>
+              <a:latin typeface="BadaBoom BB" panose="020B0603050302020204" pitchFamily="34" charset="0"/>
+            </a:endParaRPr>
+          </a:p>
+        </p:txBody>
+      </p:sp>
+      <p:sp>
+        <p:nvSpPr>
+          <p:cNvPr id="8" name="Espace réservé du numéro de diapositive 7"/>
+          <p:cNvSpPr>
+            <a:spLocks noGrp="1"/>
+          </p:cNvSpPr>
+          <p:nvPr>
+            <p:ph type="sldNum" sz="quarter" idx="12"/>
+          </p:nvPr>
+        </p:nvSpPr>
+        <p:spPr/>
+        <p:txBody>
+          <a:bodyPr/>
+          <a:lstStyle/>
+          <a:p>
+            <a:fld id="{D347F7E7-DA46-45CC-ACCA-4679FD1F5CF6}" type="slidenum">
+              <a:rPr lang="fr-FR" smtClean="0">
+                <a:solidFill>
+                  <a:schemeClr val="bg1"/>
+                </a:solidFill>
+              </a:rPr>
+              <a:t>6</a:t>
             </a:fld>
             <a:endParaRPr lang="fr-FR" dirty="0">
               <a:solidFill>
@@ -4807,6 +6214,18 @@
   <p:clrMapOvr>
     <a:masterClrMapping/>
   </p:clrMapOvr>
+  <mc:AlternateContent xmlns:mc="http://schemas.openxmlformats.org/markup-compatibility/2006">
+    <mc:Choice xmlns:p14="http://schemas.microsoft.com/office/powerpoint/2010/main" Requires="p14">
+      <p:transition spd="med" p14:dur="700">
+        <p:fade/>
+      </p:transition>
+    </mc:Choice>
+    <mc:Fallback>
+      <p:transition spd="med">
+        <p:fade/>
+      </p:transition>
+    </mc:Fallback>
+  </mc:AlternateContent>
   <p:timing>
     <p:tnLst>
       <p:par>

</xml_diff>

<commit_message>
Optimisation style - pptx
</commit_message>
<xml_diff>
--- a/Presentation.pptx
+++ b/Presentation.pptx
@@ -5,7 +5,7 @@
     <p:sldMasterId id="2147483648" r:id="rId1"/>
   </p:sldMasterIdLst>
   <p:notesMasterIdLst>
-    <p:notesMasterId r:id="rId8"/>
+    <p:notesMasterId r:id="rId9"/>
   </p:notesMasterIdLst>
   <p:sldIdLst>
     <p:sldId id="256" r:id="rId2"/>
@@ -14,6 +14,7 @@
     <p:sldId id="258" r:id="rId5"/>
     <p:sldId id="261" r:id="rId6"/>
     <p:sldId id="259" r:id="rId7"/>
+    <p:sldId id="262" r:id="rId8"/>
   </p:sldIdLst>
   <p:sldSz cx="12192000" cy="6858000"/>
   <p:notesSz cx="6858000" cy="9144000"/>
@@ -881,6 +882,90 @@
     <p:extLst>
       <p:ext uri="{BB962C8B-B14F-4D97-AF65-F5344CB8AC3E}">
         <p14:creationId xmlns:p14="http://schemas.microsoft.com/office/powerpoint/2010/main" val="3133949611"/>
+      </p:ext>
+    </p:extLst>
+  </p:cSld>
+  <p:clrMapOvr>
+    <a:masterClrMapping/>
+  </p:clrMapOvr>
+</p:notes>
+</file>
+
+<file path=ppt/notesSlides/notesSlide6.xml><?xml version="1.0" encoding="utf-8"?>
+<p:notes xmlns:a="http://schemas.openxmlformats.org/drawingml/2006/main" xmlns:r="http://schemas.openxmlformats.org/officeDocument/2006/relationships" xmlns:p="http://schemas.openxmlformats.org/presentationml/2006/main">
+  <p:cSld>
+    <p:spTree>
+      <p:nvGrpSpPr>
+        <p:cNvPr id="1" name=""/>
+        <p:cNvGrpSpPr/>
+        <p:nvPr/>
+      </p:nvGrpSpPr>
+      <p:grpSpPr>
+        <a:xfrm>
+          <a:off x="0" y="0"/>
+          <a:ext cx="0" cy="0"/>
+          <a:chOff x="0" y="0"/>
+          <a:chExt cx="0" cy="0"/>
+        </a:xfrm>
+      </p:grpSpPr>
+      <p:sp>
+        <p:nvSpPr>
+          <p:cNvPr id="2" name="Espace réservé de l'image des diapositives 1"/>
+          <p:cNvSpPr>
+            <a:spLocks noGrp="1" noRot="1" noChangeAspect="1"/>
+          </p:cNvSpPr>
+          <p:nvPr>
+            <p:ph type="sldImg"/>
+          </p:nvPr>
+        </p:nvSpPr>
+        <p:spPr/>
+      </p:sp>
+      <p:sp>
+        <p:nvSpPr>
+          <p:cNvPr id="3" name="Espace réservé des commentaires 2"/>
+          <p:cNvSpPr>
+            <a:spLocks noGrp="1"/>
+          </p:cNvSpPr>
+          <p:nvPr>
+            <p:ph type="body" idx="1"/>
+          </p:nvPr>
+        </p:nvSpPr>
+        <p:spPr/>
+        <p:txBody>
+          <a:bodyPr/>
+          <a:lstStyle/>
+          <a:p>
+            <a:endParaRPr lang="fr-FR"/>
+          </a:p>
+        </p:txBody>
+      </p:sp>
+      <p:sp>
+        <p:nvSpPr>
+          <p:cNvPr id="4" name="Espace réservé du numéro de diapositive 3"/>
+          <p:cNvSpPr>
+            <a:spLocks noGrp="1"/>
+          </p:cNvSpPr>
+          <p:nvPr>
+            <p:ph type="sldNum" sz="quarter" idx="10"/>
+          </p:nvPr>
+        </p:nvSpPr>
+        <p:spPr/>
+        <p:txBody>
+          <a:bodyPr/>
+          <a:lstStyle/>
+          <a:p>
+            <a:fld id="{3C22D28A-14A0-4ACF-9A0E-BCD287B65FBA}" type="slidenum">
+              <a:rPr lang="fr-FR" smtClean="0"/>
+              <a:t>7</a:t>
+            </a:fld>
+            <a:endParaRPr lang="fr-FR"/>
+          </a:p>
+        </p:txBody>
+      </p:sp>
+    </p:spTree>
+    <p:extLst>
+      <p:ext uri="{BB962C8B-B14F-4D97-AF65-F5344CB8AC3E}">
+        <p14:creationId xmlns:p14="http://schemas.microsoft.com/office/powerpoint/2010/main" val="1778566538"/>
       </p:ext>
     </p:extLst>
   </p:cSld>
@@ -5431,7 +5516,7 @@
         </p:nvSpPr>
         <p:spPr>
           <a:xfrm>
-            <a:off x="2311524" y="2427394"/>
+            <a:off x="4038600" y="1823526"/>
             <a:ext cx="4448065" cy="523220"/>
           </a:xfrm>
           <a:prstGeom prst="rect">
@@ -5476,7 +5561,7 @@
                   <a:schemeClr val="bg1"/>
                 </a:solidFill>
               </a:rPr>
-              <a:t>Take the concept</a:t>
+              <a:t>Take the two concepts</a:t>
             </a:r>
           </a:p>
         </p:txBody>
@@ -5504,8 +5589,8 @@
         </p:blipFill>
         <p:spPr bwMode="auto">
           <a:xfrm>
-            <a:off x="8839200" y="2640937"/>
-            <a:ext cx="2239618" cy="2239618"/>
+            <a:off x="9398391" y="1926146"/>
+            <a:ext cx="1955409" cy="1955409"/>
           </a:xfrm>
           <a:prstGeom prst="rect">
             <a:avLst/>
@@ -5539,8 +5624,8 @@
         </p:nvSpPr>
         <p:spPr>
           <a:xfrm>
-            <a:off x="2583193" y="3124722"/>
-            <a:ext cx="6256007" cy="1815882"/>
+            <a:off x="4538602" y="2903851"/>
+            <a:ext cx="6256007" cy="954107"/>
           </a:xfrm>
           <a:prstGeom prst="rect">
             <a:avLst/>
@@ -5584,7 +5669,7 @@
                   <a:schemeClr val="bg1"/>
                 </a:solidFill>
               </a:rPr>
-              <a:t>Adapt it with our rules :</a:t>
+              <a:t>Mix them together</a:t>
             </a:r>
           </a:p>
           <a:p>
@@ -5598,25 +5683,106 @@
               </a:solidFill>
             </a:endParaRPr>
           </a:p>
-          <a:p>
-            <a:r>
-              <a:rPr lang="en-GB" sz="2800" i="1" dirty="0" smtClean="0">
+        </p:txBody>
+      </p:sp>
+      <p:pic>
+        <p:nvPicPr>
+          <p:cNvPr id="1030" name="Picture 6" descr="Afficher l'image d'origine"/>
+          <p:cNvPicPr>
+            <a:picLocks noChangeAspect="1" noChangeArrowheads="1"/>
+          </p:cNvPicPr>
+          <p:nvPr/>
+        </p:nvPicPr>
+        <p:blipFill>
+          <a:blip r:embed="rId5">
+            <a:extLst>
+              <a:ext uri="{28A0092B-C50C-407E-A947-70E740481C1C}">
+                <a14:useLocalDpi xmlns:a14="http://schemas.microsoft.com/office/drawing/2010/main" val="0"/>
+              </a:ext>
+            </a:extLst>
+          </a:blip>
+          <a:srcRect/>
+          <a:stretch>
+            <a:fillRect/>
+          </a:stretch>
+        </p:blipFill>
+        <p:spPr bwMode="auto">
+          <a:xfrm>
+            <a:off x="838200" y="1823526"/>
+            <a:ext cx="2051175" cy="2051175"/>
+          </a:xfrm>
+          <a:prstGeom prst="rect">
+            <a:avLst/>
+          </a:prstGeom>
+          <a:noFill/>
+          <a:extLst>
+            <a:ext uri="{909E8E84-426E-40DD-AFC4-6F175D3DCCD1}">
+              <a14:hiddenFill xmlns:a14="http://schemas.microsoft.com/office/drawing/2010/main">
                 <a:solidFill>
-                  <a:schemeClr val="bg1"/>
+                  <a:srgbClr val="FFFFFF"/>
+                </a:solidFill>
+              </a14:hiddenFill>
+            </a:ext>
+          </a:extLst>
+        </p:spPr>
+      </p:pic>
+      <p:sp>
+        <p:nvSpPr>
+          <p:cNvPr id="12" name="Rectangle 11"/>
+          <p:cNvSpPr/>
+          <p:nvPr/>
+        </p:nvSpPr>
+        <p:spPr>
+          <a:xfrm>
+            <a:off x="3123232" y="4252303"/>
+            <a:ext cx="6096000" cy="1384995"/>
+          </a:xfrm>
+          <a:prstGeom prst="rect">
+            <a:avLst/>
+          </a:prstGeom>
+        </p:spPr>
+        <p:txBody>
+          <a:bodyPr>
+            <a:spAutoFit/>
+          </a:bodyPr>
+          <a:lstStyle/>
+          <a:p>
+            <a:pPr lvl="0" algn="ctr"/>
+            <a:r>
+              <a:rPr lang="en-US" sz="2800" i="1" dirty="0">
+                <a:solidFill>
+                  <a:prstClr val="white"/>
                 </a:solidFill>
               </a:rPr>
-              <a:t>      Specific topic for questions</a:t>
-            </a:r>
-          </a:p>
-          <a:p>
-            <a:r>
-              <a:rPr lang="en-GB" sz="2800" i="1" dirty="0" smtClean="0">
+              <a:t>Specific topic for questions</a:t>
+            </a:r>
+          </a:p>
+          <a:p>
+            <a:pPr lvl="0" algn="ctr"/>
+            <a:r>
+              <a:rPr lang="en-US" sz="2800" i="1" dirty="0">
                 <a:solidFill>
-                  <a:schemeClr val="bg1"/>
+                  <a:prstClr val="white"/>
                 </a:solidFill>
               </a:rPr>
-              <a:t>      50 : 50 is the only bonus available</a:t>
-            </a:r>
+              <a:t>50 : 50 is the only cheat code available</a:t>
+            </a:r>
+          </a:p>
+          <a:p>
+            <a:pPr lvl="0" algn="ctr"/>
+            <a:r>
+              <a:rPr lang="en-US" sz="2800" i="1" dirty="0">
+                <a:solidFill>
+                  <a:prstClr val="white"/>
+                </a:solidFill>
+              </a:rPr>
+              <a:t>Need to complete all categories</a:t>
+            </a:r>
+            <a:endParaRPr lang="en-GB" sz="2800" i="1" dirty="0">
+              <a:solidFill>
+                <a:prstClr val="white"/>
+              </a:solidFill>
+            </a:endParaRPr>
           </a:p>
         </p:txBody>
       </p:sp>
@@ -5697,6 +5863,246 @@
                                   </p:childTnLst>
                                 </p:cTn>
                               </p:par>
+                              <p:par>
+                                <p:cTn id="8" presetID="10" presetClass="entr" presetSubtype="0" fill="hold" nodeType="withEffect">
+                                  <p:stCondLst>
+                                    <p:cond delay="0"/>
+                                  </p:stCondLst>
+                                  <p:childTnLst>
+                                    <p:set>
+                                      <p:cBhvr>
+                                        <p:cTn id="9" dur="1" fill="hold">
+                                          <p:stCondLst>
+                                            <p:cond delay="0"/>
+                                          </p:stCondLst>
+                                        </p:cTn>
+                                        <p:tgtEl>
+                                          <p:spTgt spid="1030"/>
+                                        </p:tgtEl>
+                                        <p:attrNameLst>
+                                          <p:attrName>style.visibility</p:attrName>
+                                        </p:attrNameLst>
+                                      </p:cBhvr>
+                                      <p:to>
+                                        <p:strVal val="visible"/>
+                                      </p:to>
+                                    </p:set>
+                                    <p:animEffect transition="in" filter="fade">
+                                      <p:cBhvr>
+                                        <p:cTn id="10" dur="500"/>
+                                        <p:tgtEl>
+                                          <p:spTgt spid="1030"/>
+                                        </p:tgtEl>
+                                      </p:cBhvr>
+                                    </p:animEffect>
+                                  </p:childTnLst>
+                                </p:cTn>
+                              </p:par>
+                            </p:childTnLst>
+                          </p:cTn>
+                        </p:par>
+                      </p:childTnLst>
+                    </p:cTn>
+                  </p:par>
+                  <p:par>
+                    <p:cTn id="11" fill="hold">
+                      <p:stCondLst>
+                        <p:cond delay="indefinite"/>
+                      </p:stCondLst>
+                      <p:childTnLst>
+                        <p:par>
+                          <p:cTn id="12" fill="hold">
+                            <p:stCondLst>
+                              <p:cond delay="0"/>
+                            </p:stCondLst>
+                            <p:childTnLst>
+                              <p:par>
+                                <p:cTn id="13" presetID="10" presetClass="entr" presetSubtype="0" fill="hold" grpId="0" nodeType="clickEffect">
+                                  <p:stCondLst>
+                                    <p:cond delay="0"/>
+                                  </p:stCondLst>
+                                  <p:childTnLst>
+                                    <p:set>
+                                      <p:cBhvr>
+                                        <p:cTn id="14" dur="1" fill="hold">
+                                          <p:stCondLst>
+                                            <p:cond delay="0"/>
+                                          </p:stCondLst>
+                                        </p:cTn>
+                                        <p:tgtEl>
+                                          <p:spTgt spid="9"/>
+                                        </p:tgtEl>
+                                        <p:attrNameLst>
+                                          <p:attrName>style.visibility</p:attrName>
+                                        </p:attrNameLst>
+                                      </p:cBhvr>
+                                      <p:to>
+                                        <p:strVal val="visible"/>
+                                      </p:to>
+                                    </p:set>
+                                    <p:animEffect transition="in" filter="fade">
+                                      <p:cBhvr>
+                                        <p:cTn id="15" dur="500"/>
+                                        <p:tgtEl>
+                                          <p:spTgt spid="9"/>
+                                        </p:tgtEl>
+                                      </p:cBhvr>
+                                    </p:animEffect>
+                                  </p:childTnLst>
+                                </p:cTn>
+                              </p:par>
+                            </p:childTnLst>
+                          </p:cTn>
+                        </p:par>
+                      </p:childTnLst>
+                    </p:cTn>
+                  </p:par>
+                  <p:par>
+                    <p:cTn id="16" fill="hold">
+                      <p:stCondLst>
+                        <p:cond delay="indefinite"/>
+                      </p:stCondLst>
+                      <p:childTnLst>
+                        <p:par>
+                          <p:cTn id="17" fill="hold">
+                            <p:stCondLst>
+                              <p:cond delay="0"/>
+                            </p:stCondLst>
+                            <p:childTnLst>
+                              <p:par>
+                                <p:cTn id="18" presetID="10" presetClass="entr" presetSubtype="0" fill="hold" grpId="0" nodeType="clickEffect">
+                                  <p:stCondLst>
+                                    <p:cond delay="0"/>
+                                  </p:stCondLst>
+                                  <p:childTnLst>
+                                    <p:set>
+                                      <p:cBhvr>
+                                        <p:cTn id="19" dur="1" fill="hold">
+                                          <p:stCondLst>
+                                            <p:cond delay="0"/>
+                                          </p:stCondLst>
+                                        </p:cTn>
+                                        <p:tgtEl>
+                                          <p:spTgt spid="13"/>
+                                        </p:tgtEl>
+                                        <p:attrNameLst>
+                                          <p:attrName>style.visibility</p:attrName>
+                                        </p:attrNameLst>
+                                      </p:cBhvr>
+                                      <p:to>
+                                        <p:strVal val="visible"/>
+                                      </p:to>
+                                    </p:set>
+                                    <p:animEffect transition="in" filter="fade">
+                                      <p:cBhvr>
+                                        <p:cTn id="20" dur="500"/>
+                                        <p:tgtEl>
+                                          <p:spTgt spid="13"/>
+                                        </p:tgtEl>
+                                      </p:cBhvr>
+                                    </p:animEffect>
+                                  </p:childTnLst>
+                                </p:cTn>
+                              </p:par>
+                            </p:childTnLst>
+                          </p:cTn>
+                        </p:par>
+                      </p:childTnLst>
+                    </p:cTn>
+                  </p:par>
+                  <p:par>
+                    <p:cTn id="21" fill="hold">
+                      <p:stCondLst>
+                        <p:cond delay="indefinite"/>
+                      </p:stCondLst>
+                      <p:childTnLst>
+                        <p:par>
+                          <p:cTn id="22" fill="hold">
+                            <p:stCondLst>
+                              <p:cond delay="0"/>
+                            </p:stCondLst>
+                            <p:childTnLst>
+                              <p:par>
+                                <p:cTn id="23" presetID="42" presetClass="entr" presetSubtype="0" fill="hold" grpId="0" nodeType="clickEffect">
+                                  <p:stCondLst>
+                                    <p:cond delay="0"/>
+                                  </p:stCondLst>
+                                  <p:childTnLst>
+                                    <p:set>
+                                      <p:cBhvr>
+                                        <p:cTn id="24" dur="1" fill="hold">
+                                          <p:stCondLst>
+                                            <p:cond delay="0"/>
+                                          </p:stCondLst>
+                                        </p:cTn>
+                                        <p:tgtEl>
+                                          <p:spTgt spid="12"/>
+                                        </p:tgtEl>
+                                        <p:attrNameLst>
+                                          <p:attrName>style.visibility</p:attrName>
+                                        </p:attrNameLst>
+                                      </p:cBhvr>
+                                      <p:to>
+                                        <p:strVal val="visible"/>
+                                      </p:to>
+                                    </p:set>
+                                    <p:animEffect transition="in" filter="fade">
+                                      <p:cBhvr>
+                                        <p:cTn id="25" dur="500"/>
+                                        <p:tgtEl>
+                                          <p:spTgt spid="12"/>
+                                        </p:tgtEl>
+                                      </p:cBhvr>
+                                    </p:animEffect>
+                                    <p:anim calcmode="lin" valueType="num">
+                                      <p:cBhvr>
+                                        <p:cTn id="26" dur="500" fill="hold"/>
+                                        <p:tgtEl>
+                                          <p:spTgt spid="12"/>
+                                        </p:tgtEl>
+                                        <p:attrNameLst>
+                                          <p:attrName>ppt_x</p:attrName>
+                                        </p:attrNameLst>
+                                      </p:cBhvr>
+                                      <p:tavLst>
+                                        <p:tav tm="0">
+                                          <p:val>
+                                            <p:strVal val="#ppt_x"/>
+                                          </p:val>
+                                        </p:tav>
+                                        <p:tav tm="100000">
+                                          <p:val>
+                                            <p:strVal val="#ppt_x"/>
+                                          </p:val>
+                                        </p:tav>
+                                      </p:tavLst>
+                                    </p:anim>
+                                    <p:anim calcmode="lin" valueType="num">
+                                      <p:cBhvr>
+                                        <p:cTn id="27" dur="500" fill="hold"/>
+                                        <p:tgtEl>
+                                          <p:spTgt spid="12"/>
+                                        </p:tgtEl>
+                                        <p:attrNameLst>
+                                          <p:attrName>ppt_y</p:attrName>
+                                        </p:attrNameLst>
+                                      </p:cBhvr>
+                                      <p:tavLst>
+                                        <p:tav tm="0">
+                                          <p:val>
+                                            <p:strVal val="#ppt_y+.1"/>
+                                          </p:val>
+                                        </p:tav>
+                                        <p:tav tm="100000">
+                                          <p:val>
+                                            <p:strVal val="#ppt_y"/>
+                                          </p:val>
+                                        </p:tav>
+                                      </p:tavLst>
+                                    </p:anim>
+                                  </p:childTnLst>
+                                </p:cTn>
+                              </p:par>
                             </p:childTnLst>
                           </p:cTn>
                         </p:par>
@@ -5724,6 +6130,11 @@
         </p:cTn>
       </p:par>
     </p:tnLst>
+    <p:bldLst>
+      <p:bldP spid="9" grpId="0"/>
+      <p:bldP spid="13" grpId="0"/>
+      <p:bldP spid="12" grpId="0"/>
+    </p:bldLst>
   </p:timing>
 </p:sld>
 </file>
@@ -6042,39 +6453,6 @@
       </p:sp>
       <p:sp>
         <p:nvSpPr>
-          <p:cNvPr id="7" name="Espace réservé du pied de page 6"/>
-          <p:cNvSpPr>
-            <a:spLocks noGrp="1"/>
-          </p:cNvSpPr>
-          <p:nvPr>
-            <p:ph type="ftr" sz="quarter" idx="11"/>
-          </p:nvPr>
-        </p:nvSpPr>
-        <p:spPr/>
-        <p:txBody>
-          <a:bodyPr/>
-          <a:lstStyle/>
-          <a:p>
-            <a:r>
-              <a:rPr lang="fr-FR" sz="2400" dirty="0" smtClean="0">
-                <a:solidFill>
-                  <a:schemeClr val="bg1"/>
-                </a:solidFill>
-                <a:latin typeface="BadaBoom BB" panose="020B0603050302020204" pitchFamily="34" charset="0"/>
-              </a:rPr>
-              <a:t>Big Ben</a:t>
-            </a:r>
-            <a:endParaRPr lang="fr-FR" sz="2400" dirty="0">
-              <a:solidFill>
-                <a:schemeClr val="bg1"/>
-              </a:solidFill>
-              <a:latin typeface="BadaBoom BB" panose="020B0603050302020204" pitchFamily="34" charset="0"/>
-            </a:endParaRPr>
-          </a:p>
-        </p:txBody>
-      </p:sp>
-      <p:sp>
-        <p:nvSpPr>
           <p:cNvPr id="8" name="Espace réservé du numéro de diapositive 7"/>
           <p:cNvSpPr>
             <a:spLocks noGrp="1"/>
@@ -6112,7 +6490,7 @@
         </p:nvSpPr>
         <p:spPr>
           <a:xfrm>
-            <a:off x="3202418" y="3287575"/>
+            <a:off x="3202416" y="3145620"/>
             <a:ext cx="5787161" cy="1323439"/>
           </a:xfrm>
           <a:prstGeom prst="rect">
@@ -6134,7 +6512,9 @@
               <a:rPr lang="en-GB" sz="8000" b="1" dirty="0" smtClean="0">
                 <a:ln w="10160">
                   <a:solidFill>
-                    <a:srgbClr val="7030A0"/>
+                    <a:schemeClr val="accent6">
+                      <a:lumMod val="75000"/>
+                    </a:schemeClr>
                   </a:solidFill>
                   <a:prstDash val="solid"/>
                 </a:ln>
@@ -6155,7 +6535,9 @@
             <a:endParaRPr lang="en-GB" sz="8000" b="1" cap="none" spc="0" dirty="0">
               <a:ln w="10160">
                 <a:solidFill>
-                  <a:srgbClr val="7030A0"/>
+                  <a:schemeClr val="accent6">
+                    <a:lumMod val="75000"/>
+                  </a:schemeClr>
                 </a:solidFill>
                 <a:prstDash val="solid"/>
               </a:ln>
@@ -6196,18 +6578,404 @@
         </p:blipFill>
         <p:spPr>
           <a:xfrm>
-            <a:off x="4148833" y="759855"/>
-            <a:ext cx="3894333" cy="2105824"/>
+            <a:off x="3929005" y="802058"/>
+            <a:ext cx="4333985" cy="2343562"/>
           </a:xfrm>
           <a:prstGeom prst="rect">
             <a:avLst/>
           </a:prstGeom>
         </p:spPr>
       </p:pic>
+      <p:sp>
+        <p:nvSpPr>
+          <p:cNvPr id="3" name="ZoneTexte 2"/>
+          <p:cNvSpPr txBox="1"/>
+          <p:nvPr/>
+        </p:nvSpPr>
+        <p:spPr>
+          <a:xfrm>
+            <a:off x="4757187" y="5191294"/>
+            <a:ext cx="3018692" cy="584775"/>
+          </a:xfrm>
+          <a:prstGeom prst="rect">
+            <a:avLst/>
+          </a:prstGeom>
+          <a:noFill/>
+        </p:spPr>
+        <p:txBody>
+          <a:bodyPr wrap="square" rtlCol="0">
+            <a:spAutoFit/>
+          </a:bodyPr>
+          <a:lstStyle/>
+          <a:p>
+            <a:r>
+              <a:rPr lang="fr-FR" sz="3200" dirty="0" smtClean="0">
+                <a:solidFill>
+                  <a:srgbClr val="C80851"/>
+                </a:solidFill>
+                <a:hlinkClick r:id="rId5"/>
+              </a:rPr>
+              <a:t>BigBen </a:t>
+            </a:r>
+            <a:r>
+              <a:rPr lang="fr-FR" sz="3200" dirty="0">
+                <a:solidFill>
+                  <a:srgbClr val="C80851"/>
+                </a:solidFill>
+                <a:hlinkClick r:id="rId5"/>
+              </a:rPr>
+              <a:t>P</a:t>
+            </a:r>
+            <a:r>
+              <a:rPr lang="fr-FR" sz="3200" dirty="0" smtClean="0">
+                <a:solidFill>
+                  <a:srgbClr val="C80851"/>
+                </a:solidFill>
+                <a:hlinkClick r:id="rId5"/>
+              </a:rPr>
+              <a:t>roject</a:t>
+            </a:r>
+            <a:r>
+              <a:rPr lang="fr-FR" sz="3200" dirty="0" smtClean="0">
+                <a:solidFill>
+                  <a:srgbClr val="C80851"/>
+                </a:solidFill>
+              </a:rPr>
+              <a:t> </a:t>
+            </a:r>
+            <a:endParaRPr lang="fr-FR" sz="3200" dirty="0">
+              <a:solidFill>
+                <a:srgbClr val="C80851"/>
+              </a:solidFill>
+            </a:endParaRPr>
+          </a:p>
+        </p:txBody>
+      </p:sp>
     </p:spTree>
     <p:extLst>
       <p:ext uri="{BB962C8B-B14F-4D97-AF65-F5344CB8AC3E}">
         <p14:creationId xmlns:p14="http://schemas.microsoft.com/office/powerpoint/2010/main" val="243740278"/>
+      </p:ext>
+    </p:extLst>
+  </p:cSld>
+  <p:clrMapOvr>
+    <a:masterClrMapping/>
+  </p:clrMapOvr>
+  <mc:AlternateContent xmlns:mc="http://schemas.openxmlformats.org/markup-compatibility/2006">
+    <mc:Choice xmlns:p14="http://schemas.microsoft.com/office/powerpoint/2010/main" Requires="p14">
+      <p:transition spd="med" p14:dur="700">
+        <p:fade/>
+      </p:transition>
+    </mc:Choice>
+    <mc:Fallback>
+      <p:transition spd="med">
+        <p:fade/>
+      </p:transition>
+    </mc:Fallback>
+  </mc:AlternateContent>
+  <p:timing>
+    <p:tnLst>
+      <p:par>
+        <p:cTn id="1" dur="indefinite" restart="never" nodeType="tmRoot"/>
+      </p:par>
+    </p:tnLst>
+  </p:timing>
+</p:sld>
+</file>
+
+<file path=ppt/slides/slide7.xml><?xml version="1.0" encoding="utf-8"?>
+<p:sld xmlns:a="http://schemas.openxmlformats.org/drawingml/2006/main" xmlns:r="http://schemas.openxmlformats.org/officeDocument/2006/relationships" xmlns:p="http://schemas.openxmlformats.org/presentationml/2006/main">
+  <p:cSld>
+    <p:bg>
+      <p:bgPr>
+        <a:blipFill dpi="0" rotWithShape="1">
+          <a:blip r:embed="rId3">
+            <a:lum/>
+          </a:blip>
+          <a:srcRect/>
+          <a:stretch>
+            <a:fillRect l="-11000" r="-11000"/>
+          </a:stretch>
+        </a:blipFill>
+        <a:effectLst/>
+      </p:bgPr>
+    </p:bg>
+    <p:spTree>
+      <p:nvGrpSpPr>
+        <p:cNvPr id="1" name=""/>
+        <p:cNvGrpSpPr/>
+        <p:nvPr/>
+      </p:nvGrpSpPr>
+      <p:grpSpPr>
+        <a:xfrm>
+          <a:off x="0" y="0"/>
+          <a:ext cx="0" cy="0"/>
+          <a:chOff x="0" y="0"/>
+          <a:chExt cx="0" cy="0"/>
+        </a:xfrm>
+      </p:grpSpPr>
+      <p:sp>
+        <p:nvSpPr>
+          <p:cNvPr id="6" name="Espace réservé de la date 5"/>
+          <p:cNvSpPr>
+            <a:spLocks noGrp="1"/>
+          </p:cNvSpPr>
+          <p:nvPr>
+            <p:ph type="dt" sz="half" idx="10"/>
+          </p:nvPr>
+        </p:nvSpPr>
+        <p:spPr/>
+        <p:txBody>
+          <a:bodyPr/>
+          <a:lstStyle/>
+          <a:p>
+            <a:fld id="{1D42B496-28C6-43F1-AA5E-DCEC283D924C}" type="datetime1">
+              <a:rPr lang="fr-FR" smtClean="0">
+                <a:solidFill>
+                  <a:schemeClr val="bg1"/>
+                </a:solidFill>
+              </a:rPr>
+              <a:t>18/03/2016</a:t>
+            </a:fld>
+            <a:endParaRPr lang="fr-FR" dirty="0">
+              <a:solidFill>
+                <a:schemeClr val="bg1"/>
+              </a:solidFill>
+            </a:endParaRPr>
+          </a:p>
+        </p:txBody>
+      </p:sp>
+      <p:sp>
+        <p:nvSpPr>
+          <p:cNvPr id="7" name="Espace réservé du pied de page 6"/>
+          <p:cNvSpPr>
+            <a:spLocks noGrp="1"/>
+          </p:cNvSpPr>
+          <p:nvPr>
+            <p:ph type="ftr" sz="quarter" idx="11"/>
+          </p:nvPr>
+        </p:nvSpPr>
+        <p:spPr/>
+        <p:txBody>
+          <a:bodyPr/>
+          <a:lstStyle/>
+          <a:p>
+            <a:r>
+              <a:rPr lang="fr-FR" sz="2400" dirty="0" smtClean="0">
+                <a:solidFill>
+                  <a:schemeClr val="bg1"/>
+                </a:solidFill>
+                <a:latin typeface="BadaBoom BB" panose="020B0603050302020204" pitchFamily="34" charset="0"/>
+              </a:rPr>
+              <a:t>Big Ben</a:t>
+            </a:r>
+            <a:endParaRPr lang="fr-FR" sz="2400" dirty="0">
+              <a:solidFill>
+                <a:schemeClr val="bg1"/>
+              </a:solidFill>
+              <a:latin typeface="BadaBoom BB" panose="020B0603050302020204" pitchFamily="34" charset="0"/>
+            </a:endParaRPr>
+          </a:p>
+        </p:txBody>
+      </p:sp>
+      <p:sp>
+        <p:nvSpPr>
+          <p:cNvPr id="8" name="Espace réservé du numéro de diapositive 7"/>
+          <p:cNvSpPr>
+            <a:spLocks noGrp="1"/>
+          </p:cNvSpPr>
+          <p:nvPr>
+            <p:ph type="sldNum" sz="quarter" idx="12"/>
+          </p:nvPr>
+        </p:nvSpPr>
+        <p:spPr/>
+        <p:txBody>
+          <a:bodyPr/>
+          <a:lstStyle/>
+          <a:p>
+            <a:fld id="{D347F7E7-DA46-45CC-ACCA-4679FD1F5CF6}" type="slidenum">
+              <a:rPr lang="fr-FR" smtClean="0">
+                <a:solidFill>
+                  <a:schemeClr val="bg1"/>
+                </a:solidFill>
+              </a:rPr>
+              <a:t>7</a:t>
+            </a:fld>
+            <a:endParaRPr lang="fr-FR" dirty="0">
+              <a:solidFill>
+                <a:schemeClr val="bg1"/>
+              </a:solidFill>
+            </a:endParaRPr>
+          </a:p>
+        </p:txBody>
+      </p:sp>
+      <p:sp>
+        <p:nvSpPr>
+          <p:cNvPr id="5" name="Rectangle 4"/>
+          <p:cNvSpPr/>
+          <p:nvPr/>
+        </p:nvSpPr>
+        <p:spPr>
+          <a:xfrm>
+            <a:off x="2595109" y="3450683"/>
+            <a:ext cx="7213834" cy="1015663"/>
+          </a:xfrm>
+          <a:prstGeom prst="rect">
+            <a:avLst/>
+          </a:prstGeom>
+          <a:noFill/>
+          <a:ln>
+            <a:noFill/>
+          </a:ln>
+        </p:spPr>
+        <p:txBody>
+          <a:bodyPr wrap="none" lIns="91440" tIns="45720" rIns="91440" bIns="45720">
+            <a:spAutoFit/>
+          </a:bodyPr>
+          <a:lstStyle/>
+          <a:p>
+            <a:pPr algn="ctr"/>
+            <a:r>
+              <a:rPr lang="en-GB" sz="6000" b="1" dirty="0" smtClean="0">
+                <a:ln w="10160">
+                  <a:solidFill>
+                    <a:srgbClr val="F8649C"/>
+                  </a:solidFill>
+                  <a:prstDash val="solid"/>
+                </a:ln>
+                <a:solidFill>
+                  <a:srgbClr val="FFFFFF"/>
+                </a:solidFill>
+                <a:effectLst>
+                  <a:outerShdw blurRad="38100" dist="22860" dir="5400000" algn="tl" rotWithShape="0">
+                    <a:srgbClr val="000000">
+                      <a:alpha val="30000"/>
+                    </a:srgbClr>
+                  </a:outerShdw>
+                </a:effectLst>
+                <a:latin typeface="BadaBoom BB" panose="020B0603050302020204" pitchFamily="34" charset="0"/>
+              </a:rPr>
+              <a:t>Thank you for your time</a:t>
+            </a:r>
+            <a:r>
+              <a:rPr lang="en-GB" sz="6000" b="1" dirty="0" smtClean="0">
+                <a:ln w="10160">
+                  <a:solidFill>
+                    <a:srgbClr val="F8649C"/>
+                  </a:solidFill>
+                  <a:prstDash val="solid"/>
+                </a:ln>
+                <a:solidFill>
+                  <a:srgbClr val="FFFFFF"/>
+                </a:solidFill>
+                <a:effectLst>
+                  <a:outerShdw blurRad="38100" dist="22860" dir="5400000" algn="tl" rotWithShape="0">
+                    <a:srgbClr val="000000">
+                      <a:alpha val="30000"/>
+                    </a:srgbClr>
+                  </a:outerShdw>
+                </a:effectLst>
+                <a:latin typeface="BadaBoom BB" panose="020B0603050302020204" pitchFamily="34" charset="0"/>
+              </a:rPr>
+              <a:t> !</a:t>
+            </a:r>
+            <a:endParaRPr lang="en-GB" sz="6000" b="1" dirty="0" smtClean="0">
+              <a:ln w="10160">
+                <a:solidFill>
+                  <a:srgbClr val="F8649C"/>
+                </a:solidFill>
+                <a:prstDash val="solid"/>
+              </a:ln>
+              <a:solidFill>
+                <a:srgbClr val="FFFFFF"/>
+              </a:solidFill>
+              <a:effectLst>
+                <a:outerShdw blurRad="38100" dist="22860" dir="5400000" algn="tl" rotWithShape="0">
+                  <a:srgbClr val="000000">
+                    <a:alpha val="30000"/>
+                  </a:srgbClr>
+                </a:outerShdw>
+              </a:effectLst>
+              <a:latin typeface="BadaBoom BB" panose="020B0603050302020204" pitchFamily="34" charset="0"/>
+            </a:endParaRPr>
+          </a:p>
+        </p:txBody>
+      </p:sp>
+      <p:pic>
+        <p:nvPicPr>
+          <p:cNvPr id="2" name="Image 1"/>
+          <p:cNvPicPr>
+            <a:picLocks noChangeAspect="1"/>
+          </p:cNvPicPr>
+          <p:nvPr/>
+        </p:nvPicPr>
+        <p:blipFill>
+          <a:blip r:embed="rId4" cstate="print">
+            <a:extLst>
+              <a:ext uri="{28A0092B-C50C-407E-A947-70E740481C1C}">
+                <a14:useLocalDpi xmlns:a14="http://schemas.microsoft.com/office/drawing/2010/main" val="0"/>
+              </a:ext>
+            </a:extLst>
+          </a:blip>
+          <a:stretch>
+            <a:fillRect/>
+          </a:stretch>
+        </p:blipFill>
+        <p:spPr>
+          <a:xfrm>
+            <a:off x="3865117" y="720099"/>
+            <a:ext cx="4461766" cy="2412658"/>
+          </a:xfrm>
+          <a:prstGeom prst="rect">
+            <a:avLst/>
+          </a:prstGeom>
+        </p:spPr>
+      </p:pic>
+      <p:pic>
+        <p:nvPicPr>
+          <p:cNvPr id="4098" name="Picture 2" descr="Afficher l'image d'origine"/>
+          <p:cNvPicPr>
+            <a:picLocks noChangeAspect="1" noChangeArrowheads="1"/>
+          </p:cNvPicPr>
+          <p:nvPr/>
+        </p:nvPicPr>
+        <p:blipFill>
+          <a:blip r:embed="rId5">
+            <a:extLst>
+              <a:ext uri="{28A0092B-C50C-407E-A947-70E740481C1C}">
+                <a14:useLocalDpi xmlns:a14="http://schemas.microsoft.com/office/drawing/2010/main" val="0"/>
+              </a:ext>
+            </a:extLst>
+          </a:blip>
+          <a:srcRect/>
+          <a:stretch>
+            <a:fillRect/>
+          </a:stretch>
+        </p:blipFill>
+        <p:spPr bwMode="auto">
+          <a:xfrm>
+            <a:off x="10140422" y="5022761"/>
+            <a:ext cx="1698714" cy="1698714"/>
+          </a:xfrm>
+          <a:prstGeom prst="rect">
+            <a:avLst/>
+          </a:prstGeom>
+          <a:noFill/>
+          <a:extLst>
+            <a:ext uri="{909E8E84-426E-40DD-AFC4-6F175D3DCCD1}">
+              <a14:hiddenFill xmlns:a14="http://schemas.microsoft.com/office/drawing/2010/main">
+                <a:solidFill>
+                  <a:srgbClr val="FFFFFF"/>
+                </a:solidFill>
+              </a14:hiddenFill>
+            </a:ext>
+          </a:extLst>
+        </p:spPr>
+      </p:pic>
+    </p:spTree>
+    <p:extLst>
+      <p:ext uri="{BB962C8B-B14F-4D97-AF65-F5344CB8AC3E}">
+        <p14:creationId xmlns:p14="http://schemas.microsoft.com/office/powerpoint/2010/main" val="2572007235"/>
       </p:ext>
     </p:extLst>
   </p:cSld>

</xml_diff>